<commit_message>
Changement diapo accueil avec la photo c'est mieux
</commit_message>
<xml_diff>
--- a/ProjetFinalAAA-Factory.pptx
+++ b/ProjetFinalAAA-Factory.pptx
@@ -4677,6 +4677,13 @@
         </dgm:presLayoutVars>
       </dgm:prSet>
       <dgm:spPr/>
+      <dgm:t>
+        <a:bodyPr/>
+        <a:lstStyle/>
+        <a:p>
+          <a:endParaRPr lang="fr-FR"/>
+        </a:p>
+      </dgm:t>
     </dgm:pt>
     <dgm:pt modelId="{DAED368B-DBF1-41CC-B883-57F98E313CF5}" type="pres">
       <dgm:prSet presAssocID="{1DF8DF3B-E3E0-4324-B8A1-C4AF68986A28}" presName="composite" presStyleCnt="0"/>
@@ -4690,6 +4697,13 @@
         </dgm:presLayoutVars>
       </dgm:prSet>
       <dgm:spPr/>
+      <dgm:t>
+        <a:bodyPr/>
+        <a:lstStyle/>
+        <a:p>
+          <a:endParaRPr lang="fr-FR"/>
+        </a:p>
+      </dgm:t>
     </dgm:pt>
     <dgm:pt modelId="{39D7EDD9-031A-47C8-8B3A-1230B0D4063A}" type="pres">
       <dgm:prSet presAssocID="{1DF8DF3B-E3E0-4324-B8A1-C4AF68986A28}" presName="descendantText" presStyleLbl="alignAcc1" presStyleIdx="0" presStyleCnt="4">
@@ -4722,6 +4736,13 @@
         </dgm:presLayoutVars>
       </dgm:prSet>
       <dgm:spPr/>
+      <dgm:t>
+        <a:bodyPr/>
+        <a:lstStyle/>
+        <a:p>
+          <a:endParaRPr lang="fr-FR"/>
+        </a:p>
+      </dgm:t>
     </dgm:pt>
     <dgm:pt modelId="{DADE07FF-1CDA-4989-876E-7701F568B959}" type="pres">
       <dgm:prSet presAssocID="{79F75EF8-D10D-4D5E-AA9C-7F12F088A5F7}" presName="descendantText" presStyleLbl="alignAcc1" presStyleIdx="1" presStyleCnt="4">
@@ -4754,6 +4775,13 @@
         </dgm:presLayoutVars>
       </dgm:prSet>
       <dgm:spPr/>
+      <dgm:t>
+        <a:bodyPr/>
+        <a:lstStyle/>
+        <a:p>
+          <a:endParaRPr lang="fr-FR"/>
+        </a:p>
+      </dgm:t>
     </dgm:pt>
     <dgm:pt modelId="{5B93D43C-5124-4D00-A8CB-11DF4948966A}" type="pres">
       <dgm:prSet presAssocID="{214B4FD3-D231-4905-825C-DD4E316E9913}" presName="descendantText" presStyleLbl="alignAcc1" presStyleIdx="2" presStyleCnt="4">
@@ -4801,32 +4829,39 @@
         </dgm:presLayoutVars>
       </dgm:prSet>
       <dgm:spPr/>
+      <dgm:t>
+        <a:bodyPr/>
+        <a:lstStyle/>
+        <a:p>
+          <a:endParaRPr lang="fr-FR"/>
+        </a:p>
+      </dgm:t>
     </dgm:pt>
   </dgm:ptLst>
   <dgm:cxnLst>
+    <dgm:cxn modelId="{88706722-3D7C-45CC-88E2-75CD90077BFC}" type="presOf" srcId="{214B4FD3-D231-4905-825C-DD4E316E9913}" destId="{42F6DD47-9CDD-4CFD-988A-E80234CBD3CB}" srcOrd="0" destOrd="0" presId="urn:microsoft.com/office/officeart/2005/8/layout/chevron2"/>
+    <dgm:cxn modelId="{9E69CD0D-4DE9-40FB-A5AA-1A0280A03B3B}" srcId="{9893B95B-4F14-4805-96AD-94C2779E991F}" destId="{4049B200-1177-4110-B7B7-F5AB361BEEDB}" srcOrd="3" destOrd="0" parTransId="{EA0AE0EC-051C-444F-9086-FCF464B88C7D}" sibTransId="{111E22B1-7310-445E-8198-9F3DDFF10DD1}"/>
+    <dgm:cxn modelId="{4D16E7B4-7003-434A-B233-FFAC1E1ED754}" type="presOf" srcId="{99FBC9E8-0302-4799-AE93-CE5C990CEA29}" destId="{5B93D43C-5124-4D00-A8CB-11DF4948966A}" srcOrd="0" destOrd="1" presId="urn:microsoft.com/office/officeart/2005/8/layout/chevron2"/>
+    <dgm:cxn modelId="{DEC32A64-CB2C-4EF6-9EC1-25CE8E73BBF1}" type="presOf" srcId="{A2483C46-B6BF-4521-AF73-DEA3043FF42E}" destId="{5B93D43C-5124-4D00-A8CB-11DF4948966A}" srcOrd="0" destOrd="0" presId="urn:microsoft.com/office/officeart/2005/8/layout/chevron2"/>
+    <dgm:cxn modelId="{9CA67892-CAEE-4E1C-8B72-1A0FEEDA5CB5}" srcId="{79F75EF8-D10D-4D5E-AA9C-7F12F088A5F7}" destId="{DCEA557C-30A6-43A2-B938-BB981A4B3FE6}" srcOrd="0" destOrd="0" parTransId="{F12E6995-B52D-4F88-B9EF-9916DC43B49C}" sibTransId="{48A151F3-87D9-44EA-99E0-0B51FD39A714}"/>
+    <dgm:cxn modelId="{E7DD3E98-6214-44AD-ADA2-A7F6FB29476C}" type="presOf" srcId="{79F75EF8-D10D-4D5E-AA9C-7F12F088A5F7}" destId="{546D62F4-D67F-4A18-8368-4ACFA371B101}" srcOrd="0" destOrd="0" presId="urn:microsoft.com/office/officeart/2005/8/layout/chevron2"/>
+    <dgm:cxn modelId="{F184CCE4-73C4-4B9C-8C12-0C4FE513B84E}" srcId="{1DF8DF3B-E3E0-4324-B8A1-C4AF68986A28}" destId="{D5EF4FC0-69D6-47A1-9522-800DAEDFA099}" srcOrd="1" destOrd="0" parTransId="{ED9B464F-D346-420F-9743-794614A505CD}" sibTransId="{76450402-7A65-4FFB-AE27-3E3910518074}"/>
+    <dgm:cxn modelId="{CADC744D-7595-4B3B-B7D8-A85DCD1F25DB}" type="presOf" srcId="{D5EF4FC0-69D6-47A1-9522-800DAEDFA099}" destId="{39D7EDD9-031A-47C8-8B3A-1230B0D4063A}" srcOrd="0" destOrd="1" presId="urn:microsoft.com/office/officeart/2005/8/layout/chevron2"/>
+    <dgm:cxn modelId="{46672039-B615-49F6-AAEA-48C917BF7B4B}" srcId="{214B4FD3-D231-4905-825C-DD4E316E9913}" destId="{99FBC9E8-0302-4799-AE93-CE5C990CEA29}" srcOrd="1" destOrd="0" parTransId="{581BACD3-4DAB-4577-B45C-8576C8B7ACEC}" sibTransId="{559B33E4-C337-45CC-8B34-90EBB6EAC06D}"/>
+    <dgm:cxn modelId="{082F2BC3-D480-4337-A1DB-971198CD3F48}" type="presOf" srcId="{E866001A-19CD-46D1-AFC0-69878058868E}" destId="{304BBC03-2D4B-4C5B-80A6-B9C7D830CBFA}" srcOrd="0" destOrd="0" presId="urn:microsoft.com/office/officeart/2005/8/layout/chevron2"/>
+    <dgm:cxn modelId="{867C81D0-3320-43CF-B7A1-9519BB01B689}" type="presOf" srcId="{9893B95B-4F14-4805-96AD-94C2779E991F}" destId="{4FAE4416-771B-41BB-B0DC-84C187A71B3F}" srcOrd="0" destOrd="0" presId="urn:microsoft.com/office/officeart/2005/8/layout/chevron2"/>
+    <dgm:cxn modelId="{E08AC7F0-2D75-41E8-8EF8-F21F4BD465C7}" type="presOf" srcId="{EF578D42-047E-40AE-87EE-88109A11BC23}" destId="{39D7EDD9-031A-47C8-8B3A-1230B0D4063A}" srcOrd="0" destOrd="0" presId="urn:microsoft.com/office/officeart/2005/8/layout/chevron2"/>
     <dgm:cxn modelId="{A5BA636D-94C1-48D4-A3E8-691552699D8F}" srcId="{214B4FD3-D231-4905-825C-DD4E316E9913}" destId="{A2483C46-B6BF-4521-AF73-DEA3043FF42E}" srcOrd="0" destOrd="0" parTransId="{C2CC8B79-14D9-40F2-8AAE-DDD6EE1B7D5D}" sibTransId="{2D80EF46-85D1-435D-90F2-19324EFD1A23}"/>
-    <dgm:cxn modelId="{9CA67892-CAEE-4E1C-8B72-1A0FEEDA5CB5}" srcId="{79F75EF8-D10D-4D5E-AA9C-7F12F088A5F7}" destId="{DCEA557C-30A6-43A2-B938-BB981A4B3FE6}" srcOrd="0" destOrd="0" parTransId="{F12E6995-B52D-4F88-B9EF-9916DC43B49C}" sibTransId="{48A151F3-87D9-44EA-99E0-0B51FD39A714}"/>
     <dgm:cxn modelId="{604022AF-CF7C-4789-AB77-223B9DC4C67F}" type="presOf" srcId="{4049B200-1177-4110-B7B7-F5AB361BEEDB}" destId="{D57F4918-6091-43D4-8FE1-210AC6412E38}" srcOrd="0" destOrd="0" presId="urn:microsoft.com/office/officeart/2005/8/layout/chevron2"/>
-    <dgm:cxn modelId="{F184CCE4-73C4-4B9C-8C12-0C4FE513B84E}" srcId="{1DF8DF3B-E3E0-4324-B8A1-C4AF68986A28}" destId="{D5EF4FC0-69D6-47A1-9522-800DAEDFA099}" srcOrd="1" destOrd="0" parTransId="{ED9B464F-D346-420F-9743-794614A505CD}" sibTransId="{76450402-7A65-4FFB-AE27-3E3910518074}"/>
+    <dgm:cxn modelId="{C70F13DD-EB02-4260-B720-90A935AD6608}" type="presOf" srcId="{1DF8DF3B-E3E0-4324-B8A1-C4AF68986A28}" destId="{F80C65A5-3674-41F2-A631-E961E873F666}" srcOrd="0" destOrd="0" presId="urn:microsoft.com/office/officeart/2005/8/layout/chevron2"/>
+    <dgm:cxn modelId="{8C74070A-6F2B-4050-86DE-451FAB61C0D2}" type="presOf" srcId="{F0C7921F-70E8-44F8-8A5F-0F48BF0577D9}" destId="{DADE07FF-1CDA-4989-876E-7701F568B959}" srcOrd="0" destOrd="1" presId="urn:microsoft.com/office/officeart/2005/8/layout/chevron2"/>
+    <dgm:cxn modelId="{CB7A55AD-0F81-4F07-9E51-6089958D7696}" type="presOf" srcId="{DCEA557C-30A6-43A2-B938-BB981A4B3FE6}" destId="{DADE07FF-1CDA-4989-876E-7701F568B959}" srcOrd="0" destOrd="0" presId="urn:microsoft.com/office/officeart/2005/8/layout/chevron2"/>
     <dgm:cxn modelId="{AABD1BD6-8D11-4692-BAFE-4D91F8BEDB97}" srcId="{4049B200-1177-4110-B7B7-F5AB361BEEDB}" destId="{E866001A-19CD-46D1-AFC0-69878058868E}" srcOrd="0" destOrd="0" parTransId="{28AC7C0F-C4E3-48E9-A8A7-C03DCC3AE1DE}" sibTransId="{62B48BC0-34CF-4C46-B47A-E16090E68DD2}"/>
-    <dgm:cxn modelId="{4D16E7B4-7003-434A-B233-FFAC1E1ED754}" type="presOf" srcId="{99FBC9E8-0302-4799-AE93-CE5C990CEA29}" destId="{5B93D43C-5124-4D00-A8CB-11DF4948966A}" srcOrd="0" destOrd="1" presId="urn:microsoft.com/office/officeart/2005/8/layout/chevron2"/>
-    <dgm:cxn modelId="{082F2BC3-D480-4337-A1DB-971198CD3F48}" type="presOf" srcId="{E866001A-19CD-46D1-AFC0-69878058868E}" destId="{304BBC03-2D4B-4C5B-80A6-B9C7D830CBFA}" srcOrd="0" destOrd="0" presId="urn:microsoft.com/office/officeart/2005/8/layout/chevron2"/>
+    <dgm:cxn modelId="{BA85B40E-F9B3-477C-BD65-CE7E77738937}" srcId="{79F75EF8-D10D-4D5E-AA9C-7F12F088A5F7}" destId="{F0C7921F-70E8-44F8-8A5F-0F48BF0577D9}" srcOrd="1" destOrd="0" parTransId="{DC48D501-3BD0-43AB-BA17-DB86A4D9FD1B}" sibTransId="{C5E7331B-D7A4-49A4-98AB-CD1D78C3CB3A}"/>
+    <dgm:cxn modelId="{E6584AFC-7D11-4F99-BC07-809C4E264DA6}" srcId="{9893B95B-4F14-4805-96AD-94C2779E991F}" destId="{1DF8DF3B-E3E0-4324-B8A1-C4AF68986A28}" srcOrd="0" destOrd="0" parTransId="{D2F84A3E-F170-4BA8-B9F6-A25748C5510C}" sibTransId="{67F841AE-42DB-4001-9D6E-DCFD16317367}"/>
     <dgm:cxn modelId="{785BAE4D-4E26-4169-8379-97E2F3AA2115}" srcId="{9893B95B-4F14-4805-96AD-94C2779E991F}" destId="{79F75EF8-D10D-4D5E-AA9C-7F12F088A5F7}" srcOrd="1" destOrd="0" parTransId="{7768A805-59A5-49ED-AC1C-C598031CE482}" sibTransId="{5EAA440D-1169-4902-B66C-A34D5CC52D79}"/>
     <dgm:cxn modelId="{0036B714-06D2-45A9-A3D8-9A646DA8C386}" srcId="{9893B95B-4F14-4805-96AD-94C2779E991F}" destId="{214B4FD3-D231-4905-825C-DD4E316E9913}" srcOrd="2" destOrd="0" parTransId="{D75B4266-F567-4A3E-A844-F412A570786E}" sibTransId="{B867592A-8AF6-41DF-AB01-CD7ADD1B612B}"/>
-    <dgm:cxn modelId="{DEC32A64-CB2C-4EF6-9EC1-25CE8E73BBF1}" type="presOf" srcId="{A2483C46-B6BF-4521-AF73-DEA3043FF42E}" destId="{5B93D43C-5124-4D00-A8CB-11DF4948966A}" srcOrd="0" destOrd="0" presId="urn:microsoft.com/office/officeart/2005/8/layout/chevron2"/>
-    <dgm:cxn modelId="{CADC744D-7595-4B3B-B7D8-A85DCD1F25DB}" type="presOf" srcId="{D5EF4FC0-69D6-47A1-9522-800DAEDFA099}" destId="{39D7EDD9-031A-47C8-8B3A-1230B0D4063A}" srcOrd="0" destOrd="1" presId="urn:microsoft.com/office/officeart/2005/8/layout/chevron2"/>
-    <dgm:cxn modelId="{8C74070A-6F2B-4050-86DE-451FAB61C0D2}" type="presOf" srcId="{F0C7921F-70E8-44F8-8A5F-0F48BF0577D9}" destId="{DADE07FF-1CDA-4989-876E-7701F568B959}" srcOrd="0" destOrd="1" presId="urn:microsoft.com/office/officeart/2005/8/layout/chevron2"/>
-    <dgm:cxn modelId="{88706722-3D7C-45CC-88E2-75CD90077BFC}" type="presOf" srcId="{214B4FD3-D231-4905-825C-DD4E316E9913}" destId="{42F6DD47-9CDD-4CFD-988A-E80234CBD3CB}" srcOrd="0" destOrd="0" presId="urn:microsoft.com/office/officeart/2005/8/layout/chevron2"/>
-    <dgm:cxn modelId="{E08AC7F0-2D75-41E8-8EF8-F21F4BD465C7}" type="presOf" srcId="{EF578D42-047E-40AE-87EE-88109A11BC23}" destId="{39D7EDD9-031A-47C8-8B3A-1230B0D4063A}" srcOrd="0" destOrd="0" presId="urn:microsoft.com/office/officeart/2005/8/layout/chevron2"/>
-    <dgm:cxn modelId="{46672039-B615-49F6-AAEA-48C917BF7B4B}" srcId="{214B4FD3-D231-4905-825C-DD4E316E9913}" destId="{99FBC9E8-0302-4799-AE93-CE5C990CEA29}" srcOrd="1" destOrd="0" parTransId="{581BACD3-4DAB-4577-B45C-8576C8B7ACEC}" sibTransId="{559B33E4-C337-45CC-8B34-90EBB6EAC06D}"/>
-    <dgm:cxn modelId="{E7DD3E98-6214-44AD-ADA2-A7F6FB29476C}" type="presOf" srcId="{79F75EF8-D10D-4D5E-AA9C-7F12F088A5F7}" destId="{546D62F4-D67F-4A18-8368-4ACFA371B101}" srcOrd="0" destOrd="0" presId="urn:microsoft.com/office/officeart/2005/8/layout/chevron2"/>
     <dgm:cxn modelId="{740EADB9-AFFE-4C48-988B-410DF28866F2}" srcId="{1DF8DF3B-E3E0-4324-B8A1-C4AF68986A28}" destId="{EF578D42-047E-40AE-87EE-88109A11BC23}" srcOrd="0" destOrd="0" parTransId="{D0CE72AF-0D26-4886-A594-D900A8BEB53A}" sibTransId="{EE88CF72-8BB7-4DBA-A990-5D15F3670953}"/>
-    <dgm:cxn modelId="{867C81D0-3320-43CF-B7A1-9519BB01B689}" type="presOf" srcId="{9893B95B-4F14-4805-96AD-94C2779E991F}" destId="{4FAE4416-771B-41BB-B0DC-84C187A71B3F}" srcOrd="0" destOrd="0" presId="urn:microsoft.com/office/officeart/2005/8/layout/chevron2"/>
-    <dgm:cxn modelId="{BA85B40E-F9B3-477C-BD65-CE7E77738937}" srcId="{79F75EF8-D10D-4D5E-AA9C-7F12F088A5F7}" destId="{F0C7921F-70E8-44F8-8A5F-0F48BF0577D9}" srcOrd="1" destOrd="0" parTransId="{DC48D501-3BD0-43AB-BA17-DB86A4D9FD1B}" sibTransId="{C5E7331B-D7A4-49A4-98AB-CD1D78C3CB3A}"/>
-    <dgm:cxn modelId="{C70F13DD-EB02-4260-B720-90A935AD6608}" type="presOf" srcId="{1DF8DF3B-E3E0-4324-B8A1-C4AF68986A28}" destId="{F80C65A5-3674-41F2-A631-E961E873F666}" srcOrd="0" destOrd="0" presId="urn:microsoft.com/office/officeart/2005/8/layout/chevron2"/>
-    <dgm:cxn modelId="{9E69CD0D-4DE9-40FB-A5AA-1A0280A03B3B}" srcId="{9893B95B-4F14-4805-96AD-94C2779E991F}" destId="{4049B200-1177-4110-B7B7-F5AB361BEEDB}" srcOrd="3" destOrd="0" parTransId="{EA0AE0EC-051C-444F-9086-FCF464B88C7D}" sibTransId="{111E22B1-7310-445E-8198-9F3DDFF10DD1}"/>
-    <dgm:cxn modelId="{CB7A55AD-0F81-4F07-9E51-6089958D7696}" type="presOf" srcId="{DCEA557C-30A6-43A2-B938-BB981A4B3FE6}" destId="{DADE07FF-1CDA-4989-876E-7701F568B959}" srcOrd="0" destOrd="0" presId="urn:microsoft.com/office/officeart/2005/8/layout/chevron2"/>
-    <dgm:cxn modelId="{E6584AFC-7D11-4F99-BC07-809C4E264DA6}" srcId="{9893B95B-4F14-4805-96AD-94C2779E991F}" destId="{1DF8DF3B-E3E0-4324-B8A1-C4AF68986A28}" srcOrd="0" destOrd="0" parTransId="{D2F84A3E-F170-4BA8-B9F6-A25748C5510C}" sibTransId="{67F841AE-42DB-4001-9D6E-DCFD16317367}"/>
     <dgm:cxn modelId="{369E25F4-EA00-43C1-ADFD-DEC76C0DEA1E}" type="presParOf" srcId="{4FAE4416-771B-41BB-B0DC-84C187A71B3F}" destId="{DAED368B-DBF1-41CC-B883-57F98E313CF5}" srcOrd="0" destOrd="0" presId="urn:microsoft.com/office/officeart/2005/8/layout/chevron2"/>
     <dgm:cxn modelId="{4B52A6D1-5A47-4DF4-96CF-FC3348318112}" type="presParOf" srcId="{DAED368B-DBF1-41CC-B883-57F98E313CF5}" destId="{F80C65A5-3674-41F2-A631-E961E873F666}" srcOrd="0" destOrd="0" presId="urn:microsoft.com/office/officeart/2005/8/layout/chevron2"/>
     <dgm:cxn modelId="{41CC27D5-50B5-4465-8D60-A2E46833D7FE}" type="presParOf" srcId="{DAED368B-DBF1-41CC-B883-57F98E313CF5}" destId="{39D7EDD9-031A-47C8-8B3A-1230B0D4063A}" srcOrd="1" destOrd="0" presId="urn:microsoft.com/office/officeart/2005/8/layout/chevron2"/>
@@ -5320,6 +5355,13 @@
         </dgm:presLayoutVars>
       </dgm:prSet>
       <dgm:spPr/>
+      <dgm:t>
+        <a:bodyPr/>
+        <a:lstStyle/>
+        <a:p>
+          <a:endParaRPr lang="fr-FR"/>
+        </a:p>
+      </dgm:t>
     </dgm:pt>
     <dgm:pt modelId="{DAED368B-DBF1-41CC-B883-57F98E313CF5}" type="pres">
       <dgm:prSet presAssocID="{1DF8DF3B-E3E0-4324-B8A1-C4AF68986A28}" presName="composite" presStyleCnt="0"/>
@@ -5333,6 +5375,13 @@
         </dgm:presLayoutVars>
       </dgm:prSet>
       <dgm:spPr/>
+      <dgm:t>
+        <a:bodyPr/>
+        <a:lstStyle/>
+        <a:p>
+          <a:endParaRPr lang="fr-FR"/>
+        </a:p>
+      </dgm:t>
     </dgm:pt>
     <dgm:pt modelId="{39D7EDD9-031A-47C8-8B3A-1230B0D4063A}" type="pres">
       <dgm:prSet presAssocID="{1DF8DF3B-E3E0-4324-B8A1-C4AF68986A28}" presName="descendantText" presStyleLbl="alignAcc1" presStyleIdx="0" presStyleCnt="4">
@@ -5365,6 +5414,13 @@
         </dgm:presLayoutVars>
       </dgm:prSet>
       <dgm:spPr/>
+      <dgm:t>
+        <a:bodyPr/>
+        <a:lstStyle/>
+        <a:p>
+          <a:endParaRPr lang="fr-FR"/>
+        </a:p>
+      </dgm:t>
     </dgm:pt>
     <dgm:pt modelId="{DADE07FF-1CDA-4989-876E-7701F568B959}" type="pres">
       <dgm:prSet presAssocID="{79F75EF8-D10D-4D5E-AA9C-7F12F088A5F7}" presName="descendantText" presStyleLbl="alignAcc1" presStyleIdx="1" presStyleCnt="4">
@@ -5397,6 +5453,13 @@
         </dgm:presLayoutVars>
       </dgm:prSet>
       <dgm:spPr/>
+      <dgm:t>
+        <a:bodyPr/>
+        <a:lstStyle/>
+        <a:p>
+          <a:endParaRPr lang="fr-FR"/>
+        </a:p>
+      </dgm:t>
     </dgm:pt>
     <dgm:pt modelId="{5B93D43C-5124-4D00-A8CB-11DF4948966A}" type="pres">
       <dgm:prSet presAssocID="{214B4FD3-D231-4905-825C-DD4E316E9913}" presName="descendantText" presStyleLbl="alignAcc1" presStyleIdx="2" presStyleCnt="4">
@@ -5461,22 +5524,22 @@
     <dgm:cxn modelId="{9CA67892-CAEE-4E1C-8B72-1A0FEEDA5CB5}" srcId="{79F75EF8-D10D-4D5E-AA9C-7F12F088A5F7}" destId="{DCEA557C-30A6-43A2-B938-BB981A4B3FE6}" srcOrd="0" destOrd="0" parTransId="{F12E6995-B52D-4F88-B9EF-9916DC43B49C}" sibTransId="{48A151F3-87D9-44EA-99E0-0B51FD39A714}"/>
     <dgm:cxn modelId="{F184CCE4-73C4-4B9C-8C12-0C4FE513B84E}" srcId="{1DF8DF3B-E3E0-4324-B8A1-C4AF68986A28}" destId="{D5EF4FC0-69D6-47A1-9522-800DAEDFA099}" srcOrd="1" destOrd="0" parTransId="{ED9B464F-D346-420F-9743-794614A505CD}" sibTransId="{76450402-7A65-4FFB-AE27-3E3910518074}"/>
     <dgm:cxn modelId="{46672039-B615-49F6-AAEA-48C917BF7B4B}" srcId="{214B4FD3-D231-4905-825C-DD4E316E9913}" destId="{99FBC9E8-0302-4799-AE93-CE5C990CEA29}" srcOrd="1" destOrd="0" parTransId="{581BACD3-4DAB-4577-B45C-8576C8B7ACEC}" sibTransId="{559B33E4-C337-45CC-8B34-90EBB6EAC06D}"/>
+    <dgm:cxn modelId="{B398864E-33D1-49AD-927A-C570353F3175}" type="presOf" srcId="{9893B95B-4F14-4805-96AD-94C2779E991F}" destId="{4FAE4416-771B-41BB-B0DC-84C187A71B3F}" srcOrd="0" destOrd="0" presId="urn:microsoft.com/office/officeart/2005/8/layout/chevron2"/>
     <dgm:cxn modelId="{4DCBF45F-1023-4733-A884-015BBC39A4FC}" type="presOf" srcId="{D5EF4FC0-69D6-47A1-9522-800DAEDFA099}" destId="{39D7EDD9-031A-47C8-8B3A-1230B0D4063A}" srcOrd="0" destOrd="1" presId="urn:microsoft.com/office/officeart/2005/8/layout/chevron2"/>
-    <dgm:cxn modelId="{B398864E-33D1-49AD-927A-C570353F3175}" type="presOf" srcId="{9893B95B-4F14-4805-96AD-94C2779E991F}" destId="{4FAE4416-771B-41BB-B0DC-84C187A71B3F}" srcOrd="0" destOrd="0" presId="urn:microsoft.com/office/officeart/2005/8/layout/chevron2"/>
     <dgm:cxn modelId="{429C6CB8-6F3E-4A33-B085-8FFF67A6D0BD}" type="presOf" srcId="{4049B200-1177-4110-B7B7-F5AB361BEEDB}" destId="{D57F4918-6091-43D4-8FE1-210AC6412E38}" srcOrd="0" destOrd="0" presId="urn:microsoft.com/office/officeart/2005/8/layout/chevron2"/>
     <dgm:cxn modelId="{A5BA636D-94C1-48D4-A3E8-691552699D8F}" srcId="{214B4FD3-D231-4905-825C-DD4E316E9913}" destId="{A2483C46-B6BF-4521-AF73-DEA3043FF42E}" srcOrd="0" destOrd="0" parTransId="{C2CC8B79-14D9-40F2-8AAE-DDD6EE1B7D5D}" sibTransId="{2D80EF46-85D1-435D-90F2-19324EFD1A23}"/>
     <dgm:cxn modelId="{A5C87E1A-BC11-4710-8CF1-509840DB96B9}" type="presOf" srcId="{E866001A-19CD-46D1-AFC0-69878058868E}" destId="{304BBC03-2D4B-4C5B-80A6-B9C7D830CBFA}" srcOrd="0" destOrd="0" presId="urn:microsoft.com/office/officeart/2005/8/layout/chevron2"/>
     <dgm:cxn modelId="{AABD1BD6-8D11-4692-BAFE-4D91F8BEDB97}" srcId="{4049B200-1177-4110-B7B7-F5AB361BEEDB}" destId="{E866001A-19CD-46D1-AFC0-69878058868E}" srcOrd="0" destOrd="0" parTransId="{28AC7C0F-C4E3-48E9-A8A7-C03DCC3AE1DE}" sibTransId="{62B48BC0-34CF-4C46-B47A-E16090E68DD2}"/>
     <dgm:cxn modelId="{197FB5D5-A2D7-42C9-9319-13B8337FC153}" type="presOf" srcId="{EF578D42-047E-40AE-87EE-88109A11BC23}" destId="{39D7EDD9-031A-47C8-8B3A-1230B0D4063A}" srcOrd="0" destOrd="0" presId="urn:microsoft.com/office/officeart/2005/8/layout/chevron2"/>
     <dgm:cxn modelId="{BA85B40E-F9B3-477C-BD65-CE7E77738937}" srcId="{79F75EF8-D10D-4D5E-AA9C-7F12F088A5F7}" destId="{F0C7921F-70E8-44F8-8A5F-0F48BF0577D9}" srcOrd="1" destOrd="0" parTransId="{DC48D501-3BD0-43AB-BA17-DB86A4D9FD1B}" sibTransId="{C5E7331B-D7A4-49A4-98AB-CD1D78C3CB3A}"/>
-    <dgm:cxn modelId="{E6584AFC-7D11-4F99-BC07-809C4E264DA6}" srcId="{9893B95B-4F14-4805-96AD-94C2779E991F}" destId="{1DF8DF3B-E3E0-4324-B8A1-C4AF68986A28}" srcOrd="0" destOrd="0" parTransId="{D2F84A3E-F170-4BA8-B9F6-A25748C5510C}" sibTransId="{67F841AE-42DB-4001-9D6E-DCFD16317367}"/>
     <dgm:cxn modelId="{15C1AE7B-EBEB-4F6D-A901-70FACABD7C09}" type="presOf" srcId="{99FBC9E8-0302-4799-AE93-CE5C990CEA29}" destId="{5B93D43C-5124-4D00-A8CB-11DF4948966A}" srcOrd="0" destOrd="1" presId="urn:microsoft.com/office/officeart/2005/8/layout/chevron2"/>
     <dgm:cxn modelId="{BBE806E4-34CA-49D1-9330-5EC8EDF0FBA2}" type="presOf" srcId="{79F75EF8-D10D-4D5E-AA9C-7F12F088A5F7}" destId="{546D62F4-D67F-4A18-8368-4ACFA371B101}" srcOrd="0" destOrd="0" presId="urn:microsoft.com/office/officeart/2005/8/layout/chevron2"/>
+    <dgm:cxn modelId="{E6584AFC-7D11-4F99-BC07-809C4E264DA6}" srcId="{9893B95B-4F14-4805-96AD-94C2779E991F}" destId="{1DF8DF3B-E3E0-4324-B8A1-C4AF68986A28}" srcOrd="0" destOrd="0" parTransId="{D2F84A3E-F170-4BA8-B9F6-A25748C5510C}" sibTransId="{67F841AE-42DB-4001-9D6E-DCFD16317367}"/>
     <dgm:cxn modelId="{785BAE4D-4E26-4169-8379-97E2F3AA2115}" srcId="{9893B95B-4F14-4805-96AD-94C2779E991F}" destId="{79F75EF8-D10D-4D5E-AA9C-7F12F088A5F7}" srcOrd="1" destOrd="0" parTransId="{7768A805-59A5-49ED-AC1C-C598031CE482}" sibTransId="{5EAA440D-1169-4902-B66C-A34D5CC52D79}"/>
     <dgm:cxn modelId="{83659420-9071-463D-B838-8CB982F28CC1}" srcId="{4049B200-1177-4110-B7B7-F5AB361BEEDB}" destId="{BFC0030D-C259-44BB-904F-F208DB93BBCF}" srcOrd="1" destOrd="0" parTransId="{567474EA-B2CC-4CBE-BBE7-97D3F8DB4BD2}" sibTransId="{F8FEB3AD-EE33-47AB-B7F5-529D877F516F}"/>
     <dgm:cxn modelId="{937AECFD-2F28-486E-A0E3-BC6E0E3A42B7}" type="presOf" srcId="{1DF8DF3B-E3E0-4324-B8A1-C4AF68986A28}" destId="{F80C65A5-3674-41F2-A631-E961E873F666}" srcOrd="0" destOrd="0" presId="urn:microsoft.com/office/officeart/2005/8/layout/chevron2"/>
+    <dgm:cxn modelId="{AE459D32-6FAE-4F11-8C75-05CC6D8F7610}" type="presOf" srcId="{DCEA557C-30A6-43A2-B938-BB981A4B3FE6}" destId="{DADE07FF-1CDA-4989-876E-7701F568B959}" srcOrd="0" destOrd="0" presId="urn:microsoft.com/office/officeart/2005/8/layout/chevron2"/>
     <dgm:cxn modelId="{F353F476-FDFE-4700-88CE-2E9AE1B6BE53}" type="presOf" srcId="{214B4FD3-D231-4905-825C-DD4E316E9913}" destId="{42F6DD47-9CDD-4CFD-988A-E80234CBD3CB}" srcOrd="0" destOrd="0" presId="urn:microsoft.com/office/officeart/2005/8/layout/chevron2"/>
-    <dgm:cxn modelId="{AE459D32-6FAE-4F11-8C75-05CC6D8F7610}" type="presOf" srcId="{DCEA557C-30A6-43A2-B938-BB981A4B3FE6}" destId="{DADE07FF-1CDA-4989-876E-7701F568B959}" srcOrd="0" destOrd="0" presId="urn:microsoft.com/office/officeart/2005/8/layout/chevron2"/>
     <dgm:cxn modelId="{740EADB9-AFFE-4C48-988B-410DF28866F2}" srcId="{1DF8DF3B-E3E0-4324-B8A1-C4AF68986A28}" destId="{EF578D42-047E-40AE-87EE-88109A11BC23}" srcOrd="0" destOrd="0" parTransId="{D0CE72AF-0D26-4886-A594-D900A8BEB53A}" sibTransId="{EE88CF72-8BB7-4DBA-A990-5D15F3670953}"/>
     <dgm:cxn modelId="{0036B714-06D2-45A9-A3D8-9A646DA8C386}" srcId="{9893B95B-4F14-4805-96AD-94C2779E991F}" destId="{214B4FD3-D231-4905-825C-DD4E316E9913}" srcOrd="2" destOrd="0" parTransId="{D75B4266-F567-4A3E-A844-F412A570786E}" sibTransId="{B867592A-8AF6-41DF-AB01-CD7ADD1B612B}"/>
     <dgm:cxn modelId="{883D523C-E6B4-40B1-9666-5F0C8754C2D0}" type="presParOf" srcId="{4FAE4416-771B-41BB-B0DC-84C187A71B3F}" destId="{DAED368B-DBF1-41CC-B883-57F98E313CF5}" srcOrd="0" destOrd="0" presId="urn:microsoft.com/office/officeart/2005/8/layout/chevron2"/>
@@ -5968,714 +6031,6 @@
       <dsp:cNvGrpSpPr/>
     </dsp:nvGrpSpPr>
     <dsp:grpSpPr/>
-    <dsp:sp modelId="{D7E5B174-AC4B-4F3C-8EFE-A2DBA916427B}">
-      <dsp:nvSpPr>
-        <dsp:cNvPr id="0" name=""/>
-        <dsp:cNvSpPr/>
-      </dsp:nvSpPr>
-      <dsp:spPr>
-        <a:xfrm rot="5400000">
-          <a:off x="-167351" y="170210"/>
-          <a:ext cx="1115677" cy="780974"/>
-        </a:xfrm>
-        <a:prstGeom prst="chevron">
-          <a:avLst/>
-        </a:prstGeom>
-        <a:solidFill>
-          <a:schemeClr val="accent2">
-            <a:hueOff val="0"/>
-            <a:satOff val="0"/>
-            <a:lumOff val="0"/>
-            <a:alphaOff val="0"/>
-          </a:schemeClr>
-        </a:solidFill>
-        <a:ln w="15875" cap="flat" cmpd="sng" algn="ctr">
-          <a:solidFill>
-            <a:schemeClr val="accent2">
-              <a:hueOff val="0"/>
-              <a:satOff val="0"/>
-              <a:lumOff val="0"/>
-              <a:alphaOff val="0"/>
-            </a:schemeClr>
-          </a:solidFill>
-          <a:prstDash val="solid"/>
-        </a:ln>
-        <a:effectLst/>
-      </dsp:spPr>
-      <dsp:style>
-        <a:lnRef idx="2">
-          <a:scrgbClr r="0" g="0" b="0"/>
-        </a:lnRef>
-        <a:fillRef idx="1">
-          <a:scrgbClr r="0" g="0" b="0"/>
-        </a:fillRef>
-        <a:effectRef idx="0">
-          <a:scrgbClr r="0" g="0" b="0"/>
-        </a:effectRef>
-        <a:fontRef idx="minor">
-          <a:schemeClr val="lt1"/>
-        </a:fontRef>
-      </dsp:style>
-      <dsp:txBody>
-        <a:bodyPr spcFirstLastPara="0" vert="horz" wrap="square" lIns="13335" tIns="13335" rIns="13335" bIns="13335" numCol="1" spcCol="1270" anchor="ctr" anchorCtr="0">
-          <a:noAutofit/>
-        </a:bodyPr>
-        <a:lstStyle/>
-        <a:p>
-          <a:pPr lvl="0" algn="ctr" defTabSz="933450">
-            <a:lnSpc>
-              <a:spcPct val="90000"/>
-            </a:lnSpc>
-            <a:spcBef>
-              <a:spcPct val="0"/>
-            </a:spcBef>
-            <a:spcAft>
-              <a:spcPct val="35000"/>
-            </a:spcAft>
-          </a:pPr>
-          <a:r>
-            <a:rPr lang="fr-FR" sz="2100" kern="1200" dirty="0" smtClean="0"/>
-            <a:t>30%</a:t>
-          </a:r>
-          <a:endParaRPr lang="fr-FR" sz="2100" kern="1200" dirty="0"/>
-        </a:p>
-      </dsp:txBody>
-      <dsp:txXfrm rot="-5400000">
-        <a:off x="1" y="393345"/>
-        <a:ext cx="780974" cy="334703"/>
-      </dsp:txXfrm>
-    </dsp:sp>
-    <dsp:sp modelId="{CDA8CC48-33EC-43A4-820C-229A4A1E8895}">
-      <dsp:nvSpPr>
-        <dsp:cNvPr id="0" name=""/>
-        <dsp:cNvSpPr/>
-      </dsp:nvSpPr>
-      <dsp:spPr>
-        <a:xfrm rot="5400000">
-          <a:off x="5057091" y="-4273259"/>
-          <a:ext cx="725190" cy="9277425"/>
-        </a:xfrm>
-        <a:prstGeom prst="round2SameRect">
-          <a:avLst/>
-        </a:prstGeom>
-        <a:solidFill>
-          <a:schemeClr val="lt1">
-            <a:alpha val="90000"/>
-            <a:hueOff val="0"/>
-            <a:satOff val="0"/>
-            <a:lumOff val="0"/>
-            <a:alphaOff val="0"/>
-          </a:schemeClr>
-        </a:solidFill>
-        <a:ln w="15875" cap="flat" cmpd="sng" algn="ctr">
-          <a:solidFill>
-            <a:schemeClr val="accent2">
-              <a:hueOff val="0"/>
-              <a:satOff val="0"/>
-              <a:lumOff val="0"/>
-              <a:alphaOff val="0"/>
-            </a:schemeClr>
-          </a:solidFill>
-          <a:prstDash val="solid"/>
-        </a:ln>
-        <a:effectLst/>
-      </dsp:spPr>
-      <dsp:style>
-        <a:lnRef idx="2">
-          <a:scrgbClr r="0" g="0" b="0"/>
-        </a:lnRef>
-        <a:fillRef idx="1">
-          <a:scrgbClr r="0" g="0" b="0"/>
-        </a:fillRef>
-        <a:effectRef idx="0">
-          <a:scrgbClr r="0" g="0" b="0"/>
-        </a:effectRef>
-        <a:fontRef idx="minor"/>
-      </dsp:style>
-      <dsp:txBody>
-        <a:bodyPr spcFirstLastPara="0" vert="horz" wrap="square" lIns="142240" tIns="12700" rIns="12700" bIns="12700" numCol="1" spcCol="1270" anchor="ctr" anchorCtr="0">
-          <a:noAutofit/>
-        </a:bodyPr>
-        <a:lstStyle/>
-        <a:p>
-          <a:pPr marL="228600" lvl="1" indent="-228600" algn="l" defTabSz="889000">
-            <a:lnSpc>
-              <a:spcPct val="90000"/>
-            </a:lnSpc>
-            <a:spcBef>
-              <a:spcPct val="0"/>
-            </a:spcBef>
-            <a:spcAft>
-              <a:spcPct val="15000"/>
-            </a:spcAft>
-            <a:buChar char="••"/>
-          </a:pPr>
-          <a:r>
-            <a:rPr lang="fr-FR" sz="2000" b="1" u="sng" kern="1200" dirty="0" smtClean="0"/>
-            <a:t>LE DEVELOPPEMENT</a:t>
-          </a:r>
-          <a:endParaRPr lang="fr-FR" sz="2000" b="1" u="sng" kern="1200" dirty="0"/>
-        </a:p>
-        <a:p>
-          <a:pPr marL="228600" lvl="1" indent="-228600" algn="l" defTabSz="889000">
-            <a:lnSpc>
-              <a:spcPct val="90000"/>
-            </a:lnSpc>
-            <a:spcBef>
-              <a:spcPct val="0"/>
-            </a:spcBef>
-            <a:spcAft>
-              <a:spcPct val="15000"/>
-            </a:spcAft>
-            <a:buChar char="••"/>
-          </a:pPr>
-          <a:r>
-            <a:rPr lang="fr-FR" sz="2000" kern="1200" dirty="0" smtClean="0"/>
-            <a:t>Projet </a:t>
-          </a:r>
-          <a:r>
-            <a:rPr lang="fr-FR" sz="2000" kern="1200" dirty="0" err="1" smtClean="0"/>
-            <a:t>Spring</a:t>
-          </a:r>
-          <a:r>
-            <a:rPr lang="fr-FR" sz="2000" kern="1200" dirty="0" smtClean="0"/>
-            <a:t> boot et Projet </a:t>
-          </a:r>
-          <a:r>
-            <a:rPr lang="fr-FR" sz="2000" kern="1200" dirty="0" err="1" smtClean="0"/>
-            <a:t>Angular</a:t>
-          </a:r>
-          <a:endParaRPr lang="fr-FR" sz="2000" kern="1200" dirty="0"/>
-        </a:p>
-      </dsp:txBody>
-      <dsp:txXfrm rot="-5400000">
-        <a:off x="780974" y="38259"/>
-        <a:ext cx="9242024" cy="654388"/>
-      </dsp:txXfrm>
-    </dsp:sp>
-    <dsp:sp modelId="{1177879C-8872-46E7-885A-FD73DC31CC88}">
-      <dsp:nvSpPr>
-        <dsp:cNvPr id="0" name=""/>
-        <dsp:cNvSpPr/>
-      </dsp:nvSpPr>
-      <dsp:spPr>
-        <a:xfrm rot="5400000">
-          <a:off x="-167351" y="1137320"/>
-          <a:ext cx="1115677" cy="780974"/>
-        </a:xfrm>
-        <a:prstGeom prst="chevron">
-          <a:avLst/>
-        </a:prstGeom>
-        <a:solidFill>
-          <a:schemeClr val="accent3">
-            <a:hueOff val="0"/>
-            <a:satOff val="0"/>
-            <a:lumOff val="0"/>
-            <a:alphaOff val="0"/>
-          </a:schemeClr>
-        </a:solidFill>
-        <a:ln w="15875" cap="flat" cmpd="sng" algn="ctr">
-          <a:solidFill>
-            <a:schemeClr val="accent3">
-              <a:hueOff val="0"/>
-              <a:satOff val="0"/>
-              <a:lumOff val="0"/>
-              <a:alphaOff val="0"/>
-            </a:schemeClr>
-          </a:solidFill>
-          <a:prstDash val="solid"/>
-        </a:ln>
-        <a:effectLst/>
-      </dsp:spPr>
-      <dsp:style>
-        <a:lnRef idx="2">
-          <a:scrgbClr r="0" g="0" b="0"/>
-        </a:lnRef>
-        <a:fillRef idx="1">
-          <a:scrgbClr r="0" g="0" b="0"/>
-        </a:fillRef>
-        <a:effectRef idx="0">
-          <a:scrgbClr r="0" g="0" b="0"/>
-        </a:effectRef>
-        <a:fontRef idx="minor">
-          <a:schemeClr val="lt1"/>
-        </a:fontRef>
-      </dsp:style>
-      <dsp:txBody>
-        <a:bodyPr spcFirstLastPara="0" vert="horz" wrap="square" lIns="13335" tIns="13335" rIns="13335" bIns="13335" numCol="1" spcCol="1270" anchor="ctr" anchorCtr="0">
-          <a:noAutofit/>
-        </a:bodyPr>
-        <a:lstStyle/>
-        <a:p>
-          <a:pPr lvl="0" algn="ctr" defTabSz="933450">
-            <a:lnSpc>
-              <a:spcPct val="90000"/>
-            </a:lnSpc>
-            <a:spcBef>
-              <a:spcPct val="0"/>
-            </a:spcBef>
-            <a:spcAft>
-              <a:spcPct val="35000"/>
-            </a:spcAft>
-          </a:pPr>
-          <a:r>
-            <a:rPr lang="fr-FR" sz="2100" kern="1200" dirty="0" smtClean="0"/>
-            <a:t>30%</a:t>
-          </a:r>
-          <a:endParaRPr lang="fr-FR" sz="2100" kern="1200" dirty="0"/>
-        </a:p>
-      </dsp:txBody>
-      <dsp:txXfrm rot="-5400000">
-        <a:off x="1" y="1360455"/>
-        <a:ext cx="780974" cy="334703"/>
-      </dsp:txXfrm>
-    </dsp:sp>
-    <dsp:sp modelId="{EB42497A-1B47-4808-A1CF-B43120F3D0A5}">
-      <dsp:nvSpPr>
-        <dsp:cNvPr id="0" name=""/>
-        <dsp:cNvSpPr/>
-      </dsp:nvSpPr>
-      <dsp:spPr>
-        <a:xfrm rot="5400000">
-          <a:off x="5057091" y="-3306148"/>
-          <a:ext cx="725190" cy="9277425"/>
-        </a:xfrm>
-        <a:prstGeom prst="round2SameRect">
-          <a:avLst/>
-        </a:prstGeom>
-        <a:solidFill>
-          <a:schemeClr val="lt1">
-            <a:alpha val="90000"/>
-            <a:hueOff val="0"/>
-            <a:satOff val="0"/>
-            <a:lumOff val="0"/>
-            <a:alphaOff val="0"/>
-          </a:schemeClr>
-        </a:solidFill>
-        <a:ln w="15875" cap="flat" cmpd="sng" algn="ctr">
-          <a:solidFill>
-            <a:schemeClr val="accent3">
-              <a:hueOff val="0"/>
-              <a:satOff val="0"/>
-              <a:lumOff val="0"/>
-              <a:alphaOff val="0"/>
-            </a:schemeClr>
-          </a:solidFill>
-          <a:prstDash val="solid"/>
-        </a:ln>
-        <a:effectLst/>
-      </dsp:spPr>
-      <dsp:style>
-        <a:lnRef idx="2">
-          <a:scrgbClr r="0" g="0" b="0"/>
-        </a:lnRef>
-        <a:fillRef idx="1">
-          <a:scrgbClr r="0" g="0" b="0"/>
-        </a:fillRef>
-        <a:effectRef idx="0">
-          <a:scrgbClr r="0" g="0" b="0"/>
-        </a:effectRef>
-        <a:fontRef idx="minor"/>
-      </dsp:style>
-      <dsp:txBody>
-        <a:bodyPr spcFirstLastPara="0" vert="horz" wrap="square" lIns="142240" tIns="12700" rIns="12700" bIns="12700" numCol="1" spcCol="1270" anchor="ctr" anchorCtr="0">
-          <a:noAutofit/>
-        </a:bodyPr>
-        <a:lstStyle/>
-        <a:p>
-          <a:pPr marL="228600" lvl="1" indent="-228600" algn="l" defTabSz="889000">
-            <a:lnSpc>
-              <a:spcPct val="90000"/>
-            </a:lnSpc>
-            <a:spcBef>
-              <a:spcPct val="0"/>
-            </a:spcBef>
-            <a:spcAft>
-              <a:spcPct val="15000"/>
-            </a:spcAft>
-            <a:buChar char="••"/>
-          </a:pPr>
-          <a:r>
-            <a:rPr lang="fr-FR" sz="2000" b="1" u="sng" kern="1200" dirty="0" smtClean="0"/>
-            <a:t>LES TESTS </a:t>
-          </a:r>
-          <a:endParaRPr lang="fr-FR" sz="2000" b="1" u="sng" kern="1200" dirty="0"/>
-        </a:p>
-        <a:p>
-          <a:pPr marL="228600" lvl="1" indent="-228600" algn="l" defTabSz="889000">
-            <a:lnSpc>
-              <a:spcPct val="90000"/>
-            </a:lnSpc>
-            <a:spcBef>
-              <a:spcPct val="0"/>
-            </a:spcBef>
-            <a:spcAft>
-              <a:spcPct val="15000"/>
-            </a:spcAft>
-            <a:buChar char="••"/>
-          </a:pPr>
-          <a:r>
-            <a:rPr lang="fr-FR" sz="2000" kern="1200" dirty="0" smtClean="0"/>
-            <a:t>Base de donnée (REST Controller),  Angular2 web</a:t>
-          </a:r>
-          <a:endParaRPr lang="fr-FR" sz="2000" kern="1200" dirty="0"/>
-        </a:p>
-      </dsp:txBody>
-      <dsp:txXfrm rot="-5400000">
-        <a:off x="780974" y="1005370"/>
-        <a:ext cx="9242024" cy="654388"/>
-      </dsp:txXfrm>
-    </dsp:sp>
-    <dsp:sp modelId="{2E548686-55A4-41C7-B3D7-EDE9244C4123}">
-      <dsp:nvSpPr>
-        <dsp:cNvPr id="0" name=""/>
-        <dsp:cNvSpPr/>
-      </dsp:nvSpPr>
-      <dsp:spPr>
-        <a:xfrm rot="5400000">
-          <a:off x="-167351" y="2104430"/>
-          <a:ext cx="1115677" cy="780974"/>
-        </a:xfrm>
-        <a:prstGeom prst="chevron">
-          <a:avLst/>
-        </a:prstGeom>
-        <a:solidFill>
-          <a:schemeClr val="accent4">
-            <a:hueOff val="0"/>
-            <a:satOff val="0"/>
-            <a:lumOff val="0"/>
-            <a:alphaOff val="0"/>
-          </a:schemeClr>
-        </a:solidFill>
-        <a:ln w="15875" cap="flat" cmpd="sng" algn="ctr">
-          <a:solidFill>
-            <a:schemeClr val="accent4">
-              <a:hueOff val="0"/>
-              <a:satOff val="0"/>
-              <a:lumOff val="0"/>
-              <a:alphaOff val="0"/>
-            </a:schemeClr>
-          </a:solidFill>
-          <a:prstDash val="solid"/>
-        </a:ln>
-        <a:effectLst/>
-      </dsp:spPr>
-      <dsp:style>
-        <a:lnRef idx="2">
-          <a:scrgbClr r="0" g="0" b="0"/>
-        </a:lnRef>
-        <a:fillRef idx="1">
-          <a:scrgbClr r="0" g="0" b="0"/>
-        </a:fillRef>
-        <a:effectRef idx="0">
-          <a:scrgbClr r="0" g="0" b="0"/>
-        </a:effectRef>
-        <a:fontRef idx="minor">
-          <a:schemeClr val="lt1"/>
-        </a:fontRef>
-      </dsp:style>
-      <dsp:txBody>
-        <a:bodyPr spcFirstLastPara="0" vert="horz" wrap="square" lIns="13335" tIns="13335" rIns="13335" bIns="13335" numCol="1" spcCol="1270" anchor="ctr" anchorCtr="0">
-          <a:noAutofit/>
-        </a:bodyPr>
-        <a:lstStyle/>
-        <a:p>
-          <a:pPr lvl="0" algn="ctr" defTabSz="933450">
-            <a:lnSpc>
-              <a:spcPct val="90000"/>
-            </a:lnSpc>
-            <a:spcBef>
-              <a:spcPct val="0"/>
-            </a:spcBef>
-            <a:spcAft>
-              <a:spcPct val="35000"/>
-            </a:spcAft>
-          </a:pPr>
-          <a:r>
-            <a:rPr lang="fr-FR" sz="2100" kern="1200" dirty="0" smtClean="0"/>
-            <a:t>15%</a:t>
-          </a:r>
-          <a:endParaRPr lang="fr-FR" sz="2100" kern="1200" dirty="0"/>
-        </a:p>
-      </dsp:txBody>
-      <dsp:txXfrm rot="-5400000">
-        <a:off x="1" y="2327565"/>
-        <a:ext cx="780974" cy="334703"/>
-      </dsp:txXfrm>
-    </dsp:sp>
-    <dsp:sp modelId="{F52ADA67-E94C-4552-BFAF-85B0AB32CEBC}">
-      <dsp:nvSpPr>
-        <dsp:cNvPr id="0" name=""/>
-        <dsp:cNvSpPr/>
-      </dsp:nvSpPr>
-      <dsp:spPr>
-        <a:xfrm rot="5400000">
-          <a:off x="5057091" y="-2339038"/>
-          <a:ext cx="725190" cy="9277425"/>
-        </a:xfrm>
-        <a:prstGeom prst="round2SameRect">
-          <a:avLst/>
-        </a:prstGeom>
-        <a:solidFill>
-          <a:schemeClr val="lt1">
-            <a:alpha val="90000"/>
-            <a:hueOff val="0"/>
-            <a:satOff val="0"/>
-            <a:lumOff val="0"/>
-            <a:alphaOff val="0"/>
-          </a:schemeClr>
-        </a:solidFill>
-        <a:ln w="15875" cap="flat" cmpd="sng" algn="ctr">
-          <a:solidFill>
-            <a:schemeClr val="accent4">
-              <a:hueOff val="0"/>
-              <a:satOff val="0"/>
-              <a:lumOff val="0"/>
-              <a:alphaOff val="0"/>
-            </a:schemeClr>
-          </a:solidFill>
-          <a:prstDash val="solid"/>
-        </a:ln>
-        <a:effectLst/>
-      </dsp:spPr>
-      <dsp:style>
-        <a:lnRef idx="2">
-          <a:scrgbClr r="0" g="0" b="0"/>
-        </a:lnRef>
-        <a:fillRef idx="1">
-          <a:scrgbClr r="0" g="0" b="0"/>
-        </a:fillRef>
-        <a:effectRef idx="0">
-          <a:scrgbClr r="0" g="0" b="0"/>
-        </a:effectRef>
-        <a:fontRef idx="minor"/>
-      </dsp:style>
-      <dsp:txBody>
-        <a:bodyPr spcFirstLastPara="0" vert="horz" wrap="square" lIns="142240" tIns="12700" rIns="12700" bIns="12700" numCol="1" spcCol="1270" anchor="ctr" anchorCtr="0">
-          <a:noAutofit/>
-        </a:bodyPr>
-        <a:lstStyle/>
-        <a:p>
-          <a:pPr marL="228600" lvl="1" indent="-228600" algn="l" defTabSz="889000">
-            <a:lnSpc>
-              <a:spcPct val="90000"/>
-            </a:lnSpc>
-            <a:spcBef>
-              <a:spcPct val="0"/>
-            </a:spcBef>
-            <a:spcAft>
-              <a:spcPct val="15000"/>
-            </a:spcAft>
-            <a:buChar char="••"/>
-          </a:pPr>
-          <a:r>
-            <a:rPr lang="fr-FR" sz="2000" b="1" u="sng" kern="1200" dirty="0" smtClean="0"/>
-            <a:t>LE DESIGN</a:t>
-          </a:r>
-          <a:endParaRPr lang="fr-FR" sz="2000" b="1" u="sng" kern="1200" dirty="0"/>
-        </a:p>
-        <a:p>
-          <a:pPr marL="228600" lvl="1" indent="-228600" algn="l" defTabSz="889000">
-            <a:lnSpc>
-              <a:spcPct val="90000"/>
-            </a:lnSpc>
-            <a:spcBef>
-              <a:spcPct val="0"/>
-            </a:spcBef>
-            <a:spcAft>
-              <a:spcPct val="15000"/>
-            </a:spcAft>
-            <a:buChar char="••"/>
-          </a:pPr>
-          <a:r>
-            <a:rPr lang="fr-FR" sz="2000" kern="1200" dirty="0" smtClean="0"/>
-            <a:t>Design du site, disposition, </a:t>
-          </a:r>
-          <a:r>
-            <a:rPr lang="fr-FR" sz="2000" kern="1200" dirty="0" err="1" smtClean="0"/>
-            <a:t>bootstrap</a:t>
-          </a:r>
-          <a:endParaRPr lang="fr-FR" sz="2000" kern="1200" dirty="0"/>
-        </a:p>
-      </dsp:txBody>
-      <dsp:txXfrm rot="-5400000">
-        <a:off x="780974" y="1972480"/>
-        <a:ext cx="9242024" cy="654388"/>
-      </dsp:txXfrm>
-    </dsp:sp>
-    <dsp:sp modelId="{C5EB81DF-8EE5-474A-9DAB-DF07577F553D}">
-      <dsp:nvSpPr>
-        <dsp:cNvPr id="0" name=""/>
-        <dsp:cNvSpPr/>
-      </dsp:nvSpPr>
-      <dsp:spPr>
-        <a:xfrm rot="5400000">
-          <a:off x="-167351" y="3071540"/>
-          <a:ext cx="1115677" cy="780974"/>
-        </a:xfrm>
-        <a:prstGeom prst="chevron">
-          <a:avLst/>
-        </a:prstGeom>
-        <a:solidFill>
-          <a:schemeClr val="accent5">
-            <a:hueOff val="0"/>
-            <a:satOff val="0"/>
-            <a:lumOff val="0"/>
-            <a:alphaOff val="0"/>
-          </a:schemeClr>
-        </a:solidFill>
-        <a:ln w="15875" cap="flat" cmpd="sng" algn="ctr">
-          <a:solidFill>
-            <a:schemeClr val="accent5">
-              <a:hueOff val="0"/>
-              <a:satOff val="0"/>
-              <a:lumOff val="0"/>
-              <a:alphaOff val="0"/>
-            </a:schemeClr>
-          </a:solidFill>
-          <a:prstDash val="solid"/>
-        </a:ln>
-        <a:effectLst/>
-      </dsp:spPr>
-      <dsp:style>
-        <a:lnRef idx="2">
-          <a:scrgbClr r="0" g="0" b="0"/>
-        </a:lnRef>
-        <a:fillRef idx="1">
-          <a:scrgbClr r="0" g="0" b="0"/>
-        </a:fillRef>
-        <a:effectRef idx="0">
-          <a:scrgbClr r="0" g="0" b="0"/>
-        </a:effectRef>
-        <a:fontRef idx="minor">
-          <a:schemeClr val="lt1"/>
-        </a:fontRef>
-      </dsp:style>
-      <dsp:txBody>
-        <a:bodyPr spcFirstLastPara="0" vert="horz" wrap="square" lIns="13335" tIns="13335" rIns="13335" bIns="13335" numCol="1" spcCol="1270" anchor="ctr" anchorCtr="0">
-          <a:noAutofit/>
-        </a:bodyPr>
-        <a:lstStyle/>
-        <a:p>
-          <a:pPr lvl="0" algn="ctr" defTabSz="933450">
-            <a:lnSpc>
-              <a:spcPct val="90000"/>
-            </a:lnSpc>
-            <a:spcBef>
-              <a:spcPct val="0"/>
-            </a:spcBef>
-            <a:spcAft>
-              <a:spcPct val="35000"/>
-            </a:spcAft>
-          </a:pPr>
-          <a:r>
-            <a:rPr lang="fr-FR" sz="2100" kern="1200" dirty="0" smtClean="0"/>
-            <a:t>25%</a:t>
-          </a:r>
-          <a:endParaRPr lang="fr-FR" sz="2100" kern="1200" dirty="0"/>
-        </a:p>
-      </dsp:txBody>
-      <dsp:txXfrm rot="-5400000">
-        <a:off x="1" y="3294675"/>
-        <a:ext cx="780974" cy="334703"/>
-      </dsp:txXfrm>
-    </dsp:sp>
-    <dsp:sp modelId="{44CDBF3E-36FA-4499-8E30-0704634193D8}">
-      <dsp:nvSpPr>
-        <dsp:cNvPr id="0" name=""/>
-        <dsp:cNvSpPr/>
-      </dsp:nvSpPr>
-      <dsp:spPr>
-        <a:xfrm rot="5400000">
-          <a:off x="5057091" y="-1371928"/>
-          <a:ext cx="725190" cy="9277425"/>
-        </a:xfrm>
-        <a:prstGeom prst="round2SameRect">
-          <a:avLst/>
-        </a:prstGeom>
-        <a:solidFill>
-          <a:schemeClr val="lt1">
-            <a:alpha val="90000"/>
-            <a:hueOff val="0"/>
-            <a:satOff val="0"/>
-            <a:lumOff val="0"/>
-            <a:alphaOff val="0"/>
-          </a:schemeClr>
-        </a:solidFill>
-        <a:ln w="15875" cap="flat" cmpd="sng" algn="ctr">
-          <a:solidFill>
-            <a:schemeClr val="accent5">
-              <a:hueOff val="0"/>
-              <a:satOff val="0"/>
-              <a:lumOff val="0"/>
-              <a:alphaOff val="0"/>
-            </a:schemeClr>
-          </a:solidFill>
-          <a:prstDash val="solid"/>
-        </a:ln>
-        <a:effectLst/>
-      </dsp:spPr>
-      <dsp:style>
-        <a:lnRef idx="2">
-          <a:scrgbClr r="0" g="0" b="0"/>
-        </a:lnRef>
-        <a:fillRef idx="1">
-          <a:scrgbClr r="0" g="0" b="0"/>
-        </a:fillRef>
-        <a:effectRef idx="0">
-          <a:scrgbClr r="0" g="0" b="0"/>
-        </a:effectRef>
-        <a:fontRef idx="minor"/>
-      </dsp:style>
-      <dsp:txBody>
-        <a:bodyPr spcFirstLastPara="0" vert="horz" wrap="square" lIns="142240" tIns="12700" rIns="12700" bIns="12700" numCol="1" spcCol="1270" anchor="ctr" anchorCtr="0">
-          <a:noAutofit/>
-        </a:bodyPr>
-        <a:lstStyle/>
-        <a:p>
-          <a:pPr marL="228600" lvl="1" indent="-228600" algn="l" defTabSz="889000">
-            <a:lnSpc>
-              <a:spcPct val="90000"/>
-            </a:lnSpc>
-            <a:spcBef>
-              <a:spcPct val="0"/>
-            </a:spcBef>
-            <a:spcAft>
-              <a:spcPct val="15000"/>
-            </a:spcAft>
-            <a:buChar char="••"/>
-          </a:pPr>
-          <a:r>
-            <a:rPr lang="fr-FR" sz="2000" b="1" u="sng" kern="1200" dirty="0" smtClean="0"/>
-            <a:t>LA PRESENTATION</a:t>
-          </a:r>
-          <a:endParaRPr lang="fr-FR" sz="2000" kern="1200" dirty="0"/>
-        </a:p>
-        <a:p>
-          <a:pPr marL="228600" lvl="1" indent="-228600" algn="l" defTabSz="889000">
-            <a:lnSpc>
-              <a:spcPct val="90000"/>
-            </a:lnSpc>
-            <a:spcBef>
-              <a:spcPct val="0"/>
-            </a:spcBef>
-            <a:spcAft>
-              <a:spcPct val="15000"/>
-            </a:spcAft>
-            <a:buChar char="••"/>
-          </a:pPr>
-          <a:r>
-            <a:rPr lang="fr-FR" sz="2000" kern="1200" dirty="0" smtClean="0"/>
-            <a:t>Préparation du support et présentation</a:t>
-          </a:r>
-          <a:endParaRPr lang="fr-FR" sz="2000" kern="1200" dirty="0"/>
-        </a:p>
-      </dsp:txBody>
-      <dsp:txXfrm rot="-5400000">
-        <a:off x="780974" y="2939590"/>
-        <a:ext cx="9242024" cy="654388"/>
-      </dsp:txXfrm>
-    </dsp:sp>
   </dsp:spTree>
 </dsp:drawing>
 </file>
@@ -6688,679 +6043,6 @@
       <dsp:cNvGrpSpPr/>
     </dsp:nvGrpSpPr>
     <dsp:grpSpPr/>
-    <dsp:sp modelId="{F80C65A5-3674-41F2-A631-E961E873F666}">
-      <dsp:nvSpPr>
-        <dsp:cNvPr id="0" name=""/>
-        <dsp:cNvSpPr/>
-      </dsp:nvSpPr>
-      <dsp:spPr>
-        <a:xfrm rot="5400000">
-          <a:off x="-181475" y="183176"/>
-          <a:ext cx="1209837" cy="846886"/>
-        </a:xfrm>
-        <a:prstGeom prst="chevron">
-          <a:avLst/>
-        </a:prstGeom>
-        <a:solidFill>
-          <a:schemeClr val="accent2">
-            <a:hueOff val="0"/>
-            <a:satOff val="0"/>
-            <a:lumOff val="0"/>
-            <a:alphaOff val="0"/>
-          </a:schemeClr>
-        </a:solidFill>
-        <a:ln w="15875" cap="flat" cmpd="sng" algn="ctr">
-          <a:solidFill>
-            <a:schemeClr val="accent2">
-              <a:hueOff val="0"/>
-              <a:satOff val="0"/>
-              <a:lumOff val="0"/>
-              <a:alphaOff val="0"/>
-            </a:schemeClr>
-          </a:solidFill>
-          <a:prstDash val="solid"/>
-        </a:ln>
-        <a:effectLst/>
-      </dsp:spPr>
-      <dsp:style>
-        <a:lnRef idx="2">
-          <a:scrgbClr r="0" g="0" b="0"/>
-        </a:lnRef>
-        <a:fillRef idx="1">
-          <a:scrgbClr r="0" g="0" b="0"/>
-        </a:fillRef>
-        <a:effectRef idx="0">
-          <a:scrgbClr r="0" g="0" b="0"/>
-        </a:effectRef>
-        <a:fontRef idx="minor">
-          <a:schemeClr val="lt1"/>
-        </a:fontRef>
-      </dsp:style>
-      <dsp:txBody>
-        <a:bodyPr spcFirstLastPara="0" vert="horz" wrap="square" lIns="12700" tIns="12700" rIns="12700" bIns="12700" numCol="1" spcCol="1270" anchor="ctr" anchorCtr="0">
-          <a:noAutofit/>
-        </a:bodyPr>
-        <a:lstStyle/>
-        <a:p>
-          <a:pPr lvl="0" algn="ctr" defTabSz="889000">
-            <a:lnSpc>
-              <a:spcPct val="90000"/>
-            </a:lnSpc>
-            <a:spcBef>
-              <a:spcPct val="0"/>
-            </a:spcBef>
-            <a:spcAft>
-              <a:spcPct val="35000"/>
-            </a:spcAft>
-          </a:pPr>
-          <a:r>
-            <a:rPr lang="fr-FR" sz="2000" kern="1200" dirty="0" smtClean="0"/>
-            <a:t>Sprint 0</a:t>
-          </a:r>
-          <a:endParaRPr lang="fr-FR" sz="2000" kern="1200" dirty="0"/>
-        </a:p>
-      </dsp:txBody>
-      <dsp:txXfrm rot="-5400000">
-        <a:off x="1" y="425143"/>
-        <a:ext cx="846886" cy="362951"/>
-      </dsp:txXfrm>
-    </dsp:sp>
-    <dsp:sp modelId="{39D7EDD9-031A-47C8-8B3A-1230B0D4063A}">
-      <dsp:nvSpPr>
-        <dsp:cNvPr id="0" name=""/>
-        <dsp:cNvSpPr/>
-      </dsp:nvSpPr>
-      <dsp:spPr>
-        <a:xfrm rot="5400000">
-          <a:off x="4292480" y="-3443894"/>
-          <a:ext cx="786394" cy="7677583"/>
-        </a:xfrm>
-        <a:prstGeom prst="round2SameRect">
-          <a:avLst/>
-        </a:prstGeom>
-        <a:solidFill>
-          <a:schemeClr val="lt1">
-            <a:alpha val="90000"/>
-            <a:hueOff val="0"/>
-            <a:satOff val="0"/>
-            <a:lumOff val="0"/>
-            <a:alphaOff val="0"/>
-          </a:schemeClr>
-        </a:solidFill>
-        <a:ln w="15875" cap="flat" cmpd="sng" algn="ctr">
-          <a:solidFill>
-            <a:schemeClr val="accent2">
-              <a:hueOff val="0"/>
-              <a:satOff val="0"/>
-              <a:lumOff val="0"/>
-              <a:alphaOff val="0"/>
-            </a:schemeClr>
-          </a:solidFill>
-          <a:prstDash val="solid"/>
-        </a:ln>
-        <a:effectLst/>
-      </dsp:spPr>
-      <dsp:style>
-        <a:lnRef idx="2">
-          <a:scrgbClr r="0" g="0" b="0"/>
-        </a:lnRef>
-        <a:fillRef idx="1">
-          <a:scrgbClr r="0" g="0" b="0"/>
-        </a:fillRef>
-        <a:effectRef idx="0">
-          <a:scrgbClr r="0" g="0" b="0"/>
-        </a:effectRef>
-        <a:fontRef idx="minor"/>
-      </dsp:style>
-      <dsp:txBody>
-        <a:bodyPr spcFirstLastPara="0" vert="horz" wrap="square" lIns="156464" tIns="13970" rIns="13970" bIns="13970" numCol="1" spcCol="1270" anchor="ctr" anchorCtr="0">
-          <a:noAutofit/>
-        </a:bodyPr>
-        <a:lstStyle/>
-        <a:p>
-          <a:pPr marL="228600" lvl="1" indent="-228600" algn="l" defTabSz="977900">
-            <a:lnSpc>
-              <a:spcPct val="90000"/>
-            </a:lnSpc>
-            <a:spcBef>
-              <a:spcPct val="0"/>
-            </a:spcBef>
-            <a:spcAft>
-              <a:spcPct val="15000"/>
-            </a:spcAft>
-            <a:buChar char="••"/>
-          </a:pPr>
-          <a:r>
-            <a:rPr lang="fr-FR" sz="2200" kern="1200" dirty="0" smtClean="0"/>
-            <a:t>Compréhension du sujet</a:t>
-          </a:r>
-          <a:endParaRPr lang="fr-FR" sz="2200" kern="1200" dirty="0"/>
-        </a:p>
-        <a:p>
-          <a:pPr marL="228600" lvl="1" indent="-228600" algn="l" defTabSz="977900">
-            <a:lnSpc>
-              <a:spcPct val="90000"/>
-            </a:lnSpc>
-            <a:spcBef>
-              <a:spcPct val="0"/>
-            </a:spcBef>
-            <a:spcAft>
-              <a:spcPct val="15000"/>
-            </a:spcAft>
-            <a:buChar char="••"/>
-          </a:pPr>
-          <a:r>
-            <a:rPr lang="fr-FR" sz="2200" kern="1200" dirty="0" smtClean="0"/>
-            <a:t>Diagramme des classes</a:t>
-          </a:r>
-          <a:endParaRPr lang="fr-FR" sz="2200" kern="1200" dirty="0"/>
-        </a:p>
-      </dsp:txBody>
-      <dsp:txXfrm rot="-5400000">
-        <a:off x="846886" y="40089"/>
-        <a:ext cx="7639194" cy="709616"/>
-      </dsp:txXfrm>
-    </dsp:sp>
-    <dsp:sp modelId="{546D62F4-D67F-4A18-8368-4ACFA371B101}">
-      <dsp:nvSpPr>
-        <dsp:cNvPr id="0" name=""/>
-        <dsp:cNvSpPr/>
-      </dsp:nvSpPr>
-      <dsp:spPr>
-        <a:xfrm rot="5400000">
-          <a:off x="-181475" y="1245754"/>
-          <a:ext cx="1209837" cy="846886"/>
-        </a:xfrm>
-        <a:prstGeom prst="chevron">
-          <a:avLst/>
-        </a:prstGeom>
-        <a:solidFill>
-          <a:schemeClr val="accent2">
-            <a:hueOff val="-903533"/>
-            <a:satOff val="0"/>
-            <a:lumOff val="0"/>
-            <a:alphaOff val="0"/>
-          </a:schemeClr>
-        </a:solidFill>
-        <a:ln w="15875" cap="flat" cmpd="sng" algn="ctr">
-          <a:solidFill>
-            <a:schemeClr val="accent2">
-              <a:hueOff val="-903533"/>
-              <a:satOff val="0"/>
-              <a:lumOff val="0"/>
-              <a:alphaOff val="0"/>
-            </a:schemeClr>
-          </a:solidFill>
-          <a:prstDash val="solid"/>
-        </a:ln>
-        <a:effectLst/>
-      </dsp:spPr>
-      <dsp:style>
-        <a:lnRef idx="2">
-          <a:scrgbClr r="0" g="0" b="0"/>
-        </a:lnRef>
-        <a:fillRef idx="1">
-          <a:scrgbClr r="0" g="0" b="0"/>
-        </a:fillRef>
-        <a:effectRef idx="0">
-          <a:scrgbClr r="0" g="0" b="0"/>
-        </a:effectRef>
-        <a:fontRef idx="minor">
-          <a:schemeClr val="lt1"/>
-        </a:fontRef>
-      </dsp:style>
-      <dsp:txBody>
-        <a:bodyPr spcFirstLastPara="0" vert="horz" wrap="square" lIns="12700" tIns="12700" rIns="12700" bIns="12700" numCol="1" spcCol="1270" anchor="ctr" anchorCtr="0">
-          <a:noAutofit/>
-        </a:bodyPr>
-        <a:lstStyle/>
-        <a:p>
-          <a:pPr lvl="0" algn="ctr" defTabSz="889000">
-            <a:lnSpc>
-              <a:spcPct val="90000"/>
-            </a:lnSpc>
-            <a:spcBef>
-              <a:spcPct val="0"/>
-            </a:spcBef>
-            <a:spcAft>
-              <a:spcPct val="35000"/>
-            </a:spcAft>
-          </a:pPr>
-          <a:r>
-            <a:rPr lang="fr-FR" sz="2000" kern="1200" dirty="0" smtClean="0"/>
-            <a:t>Sprint 1</a:t>
-          </a:r>
-          <a:endParaRPr lang="fr-FR" sz="2000" kern="1200" dirty="0"/>
-        </a:p>
-      </dsp:txBody>
-      <dsp:txXfrm rot="-5400000">
-        <a:off x="1" y="1487721"/>
-        <a:ext cx="846886" cy="362951"/>
-      </dsp:txXfrm>
-    </dsp:sp>
-    <dsp:sp modelId="{DADE07FF-1CDA-4989-876E-7701F568B959}">
-      <dsp:nvSpPr>
-        <dsp:cNvPr id="0" name=""/>
-        <dsp:cNvSpPr/>
-      </dsp:nvSpPr>
-      <dsp:spPr>
-        <a:xfrm rot="5400000">
-          <a:off x="4292480" y="-2381315"/>
-          <a:ext cx="786394" cy="7677583"/>
-        </a:xfrm>
-        <a:prstGeom prst="round2SameRect">
-          <a:avLst/>
-        </a:prstGeom>
-        <a:solidFill>
-          <a:schemeClr val="lt1">
-            <a:alpha val="90000"/>
-            <a:hueOff val="0"/>
-            <a:satOff val="0"/>
-            <a:lumOff val="0"/>
-            <a:alphaOff val="0"/>
-          </a:schemeClr>
-        </a:solidFill>
-        <a:ln w="15875" cap="flat" cmpd="sng" algn="ctr">
-          <a:solidFill>
-            <a:schemeClr val="accent2">
-              <a:hueOff val="-903533"/>
-              <a:satOff val="0"/>
-              <a:lumOff val="0"/>
-              <a:alphaOff val="0"/>
-            </a:schemeClr>
-          </a:solidFill>
-          <a:prstDash val="solid"/>
-        </a:ln>
-        <a:effectLst/>
-      </dsp:spPr>
-      <dsp:style>
-        <a:lnRef idx="2">
-          <a:scrgbClr r="0" g="0" b="0"/>
-        </a:lnRef>
-        <a:fillRef idx="1">
-          <a:scrgbClr r="0" g="0" b="0"/>
-        </a:fillRef>
-        <a:effectRef idx="0">
-          <a:scrgbClr r="0" g="0" b="0"/>
-        </a:effectRef>
-        <a:fontRef idx="minor"/>
-      </dsp:style>
-      <dsp:txBody>
-        <a:bodyPr spcFirstLastPara="0" vert="horz" wrap="square" lIns="156464" tIns="13970" rIns="13970" bIns="13970" numCol="1" spcCol="1270" anchor="ctr" anchorCtr="0">
-          <a:noAutofit/>
-        </a:bodyPr>
-        <a:lstStyle/>
-        <a:p>
-          <a:pPr marL="228600" lvl="1" indent="-228600" algn="l" defTabSz="977900">
-            <a:lnSpc>
-              <a:spcPct val="90000"/>
-            </a:lnSpc>
-            <a:spcBef>
-              <a:spcPct val="0"/>
-            </a:spcBef>
-            <a:spcAft>
-              <a:spcPct val="15000"/>
-            </a:spcAft>
-            <a:buChar char="••"/>
-          </a:pPr>
-          <a:r>
-            <a:rPr lang="fr-FR" sz="2200" kern="1200" dirty="0" smtClean="0"/>
-            <a:t>Mise en place des classes</a:t>
-          </a:r>
-          <a:endParaRPr lang="fr-FR" sz="2200" kern="1200" dirty="0"/>
-        </a:p>
-        <a:p>
-          <a:pPr marL="228600" lvl="1" indent="-228600" algn="l" defTabSz="977900">
-            <a:lnSpc>
-              <a:spcPct val="90000"/>
-            </a:lnSpc>
-            <a:spcBef>
-              <a:spcPct val="0"/>
-            </a:spcBef>
-            <a:spcAft>
-              <a:spcPct val="15000"/>
-            </a:spcAft>
-            <a:buChar char="••"/>
-          </a:pPr>
-          <a:r>
-            <a:rPr lang="fr-FR" sz="2200" kern="1200" dirty="0" smtClean="0"/>
-            <a:t>Débogage des classes</a:t>
-          </a:r>
-          <a:endParaRPr lang="fr-FR" sz="2200" kern="1200" dirty="0"/>
-        </a:p>
-      </dsp:txBody>
-      <dsp:txXfrm rot="-5400000">
-        <a:off x="846886" y="1102668"/>
-        <a:ext cx="7639194" cy="709616"/>
-      </dsp:txXfrm>
-    </dsp:sp>
-    <dsp:sp modelId="{42F6DD47-9CDD-4CFD-988A-E80234CBD3CB}">
-      <dsp:nvSpPr>
-        <dsp:cNvPr id="0" name=""/>
-        <dsp:cNvSpPr/>
-      </dsp:nvSpPr>
-      <dsp:spPr>
-        <a:xfrm rot="5400000">
-          <a:off x="-181475" y="2308332"/>
-          <a:ext cx="1209837" cy="846886"/>
-        </a:xfrm>
-        <a:prstGeom prst="chevron">
-          <a:avLst/>
-        </a:prstGeom>
-        <a:solidFill>
-          <a:schemeClr val="accent2">
-            <a:hueOff val="-1807066"/>
-            <a:satOff val="0"/>
-            <a:lumOff val="0"/>
-            <a:alphaOff val="0"/>
-          </a:schemeClr>
-        </a:solidFill>
-        <a:ln w="15875" cap="flat" cmpd="sng" algn="ctr">
-          <a:solidFill>
-            <a:schemeClr val="accent2">
-              <a:hueOff val="-1807066"/>
-              <a:satOff val="0"/>
-              <a:lumOff val="0"/>
-              <a:alphaOff val="0"/>
-            </a:schemeClr>
-          </a:solidFill>
-          <a:prstDash val="solid"/>
-        </a:ln>
-        <a:effectLst/>
-      </dsp:spPr>
-      <dsp:style>
-        <a:lnRef idx="2">
-          <a:scrgbClr r="0" g="0" b="0"/>
-        </a:lnRef>
-        <a:fillRef idx="1">
-          <a:scrgbClr r="0" g="0" b="0"/>
-        </a:fillRef>
-        <a:effectRef idx="0">
-          <a:scrgbClr r="0" g="0" b="0"/>
-        </a:effectRef>
-        <a:fontRef idx="minor">
-          <a:schemeClr val="lt1"/>
-        </a:fontRef>
-      </dsp:style>
-      <dsp:txBody>
-        <a:bodyPr spcFirstLastPara="0" vert="horz" wrap="square" lIns="12700" tIns="12700" rIns="12700" bIns="12700" numCol="1" spcCol="1270" anchor="ctr" anchorCtr="0">
-          <a:noAutofit/>
-        </a:bodyPr>
-        <a:lstStyle/>
-        <a:p>
-          <a:pPr lvl="0" algn="ctr" defTabSz="889000">
-            <a:lnSpc>
-              <a:spcPct val="90000"/>
-            </a:lnSpc>
-            <a:spcBef>
-              <a:spcPct val="0"/>
-            </a:spcBef>
-            <a:spcAft>
-              <a:spcPct val="35000"/>
-            </a:spcAft>
-          </a:pPr>
-          <a:r>
-            <a:rPr lang="fr-FR" sz="2000" kern="1200" dirty="0" smtClean="0"/>
-            <a:t>Sprint 2</a:t>
-          </a:r>
-          <a:endParaRPr lang="fr-FR" sz="2000" kern="1200" dirty="0"/>
-        </a:p>
-      </dsp:txBody>
-      <dsp:txXfrm rot="-5400000">
-        <a:off x="1" y="2550299"/>
-        <a:ext cx="846886" cy="362951"/>
-      </dsp:txXfrm>
-    </dsp:sp>
-    <dsp:sp modelId="{5B93D43C-5124-4D00-A8CB-11DF4948966A}">
-      <dsp:nvSpPr>
-        <dsp:cNvPr id="0" name=""/>
-        <dsp:cNvSpPr/>
-      </dsp:nvSpPr>
-      <dsp:spPr>
-        <a:xfrm rot="5400000">
-          <a:off x="4292480" y="-1318737"/>
-          <a:ext cx="786394" cy="7677583"/>
-        </a:xfrm>
-        <a:prstGeom prst="round2SameRect">
-          <a:avLst/>
-        </a:prstGeom>
-        <a:solidFill>
-          <a:schemeClr val="lt1">
-            <a:alpha val="90000"/>
-            <a:hueOff val="0"/>
-            <a:satOff val="0"/>
-            <a:lumOff val="0"/>
-            <a:alphaOff val="0"/>
-          </a:schemeClr>
-        </a:solidFill>
-        <a:ln w="15875" cap="flat" cmpd="sng" algn="ctr">
-          <a:solidFill>
-            <a:schemeClr val="accent2">
-              <a:hueOff val="-1807066"/>
-              <a:satOff val="0"/>
-              <a:lumOff val="0"/>
-              <a:alphaOff val="0"/>
-            </a:schemeClr>
-          </a:solidFill>
-          <a:prstDash val="solid"/>
-        </a:ln>
-        <a:effectLst/>
-      </dsp:spPr>
-      <dsp:style>
-        <a:lnRef idx="2">
-          <a:scrgbClr r="0" g="0" b="0"/>
-        </a:lnRef>
-        <a:fillRef idx="1">
-          <a:scrgbClr r="0" g="0" b="0"/>
-        </a:fillRef>
-        <a:effectRef idx="0">
-          <a:scrgbClr r="0" g="0" b="0"/>
-        </a:effectRef>
-        <a:fontRef idx="minor"/>
-      </dsp:style>
-      <dsp:txBody>
-        <a:bodyPr spcFirstLastPara="0" vert="horz" wrap="square" lIns="156464" tIns="13970" rIns="13970" bIns="13970" numCol="1" spcCol="1270" anchor="ctr" anchorCtr="0">
-          <a:noAutofit/>
-        </a:bodyPr>
-        <a:lstStyle/>
-        <a:p>
-          <a:pPr marL="228600" lvl="1" indent="-228600" algn="l" defTabSz="977900">
-            <a:lnSpc>
-              <a:spcPct val="90000"/>
-            </a:lnSpc>
-            <a:spcBef>
-              <a:spcPct val="0"/>
-            </a:spcBef>
-            <a:spcAft>
-              <a:spcPct val="15000"/>
-            </a:spcAft>
-            <a:buChar char="••"/>
-          </a:pPr>
-          <a:r>
-            <a:rPr lang="fr-FR" sz="2200" kern="1200" dirty="0" smtClean="0"/>
-            <a:t>Difficulté d’intégration d’une API calendrier</a:t>
-          </a:r>
-          <a:endParaRPr lang="fr-FR" sz="2200" kern="1200" dirty="0"/>
-        </a:p>
-        <a:p>
-          <a:pPr marL="228600" lvl="1" indent="-228600" algn="l" defTabSz="977900">
-            <a:lnSpc>
-              <a:spcPct val="90000"/>
-            </a:lnSpc>
-            <a:spcBef>
-              <a:spcPct val="0"/>
-            </a:spcBef>
-            <a:spcAft>
-              <a:spcPct val="15000"/>
-            </a:spcAft>
-            <a:buChar char="••"/>
-          </a:pPr>
-          <a:r>
-            <a:rPr lang="fr-FR" sz="2200" kern="1200" dirty="0" smtClean="0"/>
-            <a:t>Manque de temps</a:t>
-          </a:r>
-          <a:endParaRPr lang="fr-FR" sz="2200" kern="1200" dirty="0"/>
-        </a:p>
-      </dsp:txBody>
-      <dsp:txXfrm rot="-5400000">
-        <a:off x="846886" y="2165246"/>
-        <a:ext cx="7639194" cy="709616"/>
-      </dsp:txXfrm>
-    </dsp:sp>
-    <dsp:sp modelId="{D57F4918-6091-43D4-8FE1-210AC6412E38}">
-      <dsp:nvSpPr>
-        <dsp:cNvPr id="0" name=""/>
-        <dsp:cNvSpPr/>
-      </dsp:nvSpPr>
-      <dsp:spPr>
-        <a:xfrm rot="5400000">
-          <a:off x="-181475" y="3370910"/>
-          <a:ext cx="1209837" cy="846886"/>
-        </a:xfrm>
-        <a:prstGeom prst="chevron">
-          <a:avLst/>
-        </a:prstGeom>
-        <a:solidFill>
-          <a:schemeClr val="accent2">
-            <a:hueOff val="-2710599"/>
-            <a:satOff val="0"/>
-            <a:lumOff val="0"/>
-            <a:alphaOff val="0"/>
-          </a:schemeClr>
-        </a:solidFill>
-        <a:ln w="15875" cap="flat" cmpd="sng" algn="ctr">
-          <a:solidFill>
-            <a:schemeClr val="accent2">
-              <a:hueOff val="-2710599"/>
-              <a:satOff val="0"/>
-              <a:lumOff val="0"/>
-              <a:alphaOff val="0"/>
-            </a:schemeClr>
-          </a:solidFill>
-          <a:prstDash val="solid"/>
-        </a:ln>
-        <a:effectLst/>
-      </dsp:spPr>
-      <dsp:style>
-        <a:lnRef idx="2">
-          <a:scrgbClr r="0" g="0" b="0"/>
-        </a:lnRef>
-        <a:fillRef idx="1">
-          <a:scrgbClr r="0" g="0" b="0"/>
-        </a:fillRef>
-        <a:effectRef idx="0">
-          <a:scrgbClr r="0" g="0" b="0"/>
-        </a:effectRef>
-        <a:fontRef idx="minor">
-          <a:schemeClr val="lt1"/>
-        </a:fontRef>
-      </dsp:style>
-      <dsp:txBody>
-        <a:bodyPr spcFirstLastPara="0" vert="horz" wrap="square" lIns="12700" tIns="12700" rIns="12700" bIns="12700" numCol="1" spcCol="1270" anchor="ctr" anchorCtr="0">
-          <a:noAutofit/>
-        </a:bodyPr>
-        <a:lstStyle/>
-        <a:p>
-          <a:pPr lvl="0" algn="ctr" defTabSz="889000">
-            <a:lnSpc>
-              <a:spcPct val="90000"/>
-            </a:lnSpc>
-            <a:spcBef>
-              <a:spcPct val="0"/>
-            </a:spcBef>
-            <a:spcAft>
-              <a:spcPct val="35000"/>
-            </a:spcAft>
-          </a:pPr>
-          <a:r>
-            <a:rPr lang="fr-FR" sz="2000" kern="1200" dirty="0" smtClean="0"/>
-            <a:t>Sprint 3</a:t>
-          </a:r>
-          <a:endParaRPr lang="fr-FR" sz="2000" kern="1200" dirty="0"/>
-        </a:p>
-      </dsp:txBody>
-      <dsp:txXfrm rot="-5400000">
-        <a:off x="1" y="3612877"/>
-        <a:ext cx="846886" cy="362951"/>
-      </dsp:txXfrm>
-    </dsp:sp>
-    <dsp:sp modelId="{304BBC03-2D4B-4C5B-80A6-B9C7D830CBFA}">
-      <dsp:nvSpPr>
-        <dsp:cNvPr id="0" name=""/>
-        <dsp:cNvSpPr/>
-      </dsp:nvSpPr>
-      <dsp:spPr>
-        <a:xfrm rot="5400000">
-          <a:off x="4292480" y="-256159"/>
-          <a:ext cx="786394" cy="7677583"/>
-        </a:xfrm>
-        <a:prstGeom prst="round2SameRect">
-          <a:avLst/>
-        </a:prstGeom>
-        <a:solidFill>
-          <a:schemeClr val="lt1">
-            <a:alpha val="90000"/>
-            <a:hueOff val="0"/>
-            <a:satOff val="0"/>
-            <a:lumOff val="0"/>
-            <a:alphaOff val="0"/>
-          </a:schemeClr>
-        </a:solidFill>
-        <a:ln w="15875" cap="flat" cmpd="sng" algn="ctr">
-          <a:solidFill>
-            <a:schemeClr val="accent2">
-              <a:hueOff val="-2710599"/>
-              <a:satOff val="0"/>
-              <a:lumOff val="0"/>
-              <a:alphaOff val="0"/>
-            </a:schemeClr>
-          </a:solidFill>
-          <a:prstDash val="solid"/>
-        </a:ln>
-        <a:effectLst/>
-      </dsp:spPr>
-      <dsp:style>
-        <a:lnRef idx="2">
-          <a:scrgbClr r="0" g="0" b="0"/>
-        </a:lnRef>
-        <a:fillRef idx="1">
-          <a:scrgbClr r="0" g="0" b="0"/>
-        </a:fillRef>
-        <a:effectRef idx="0">
-          <a:scrgbClr r="0" g="0" b="0"/>
-        </a:effectRef>
-        <a:fontRef idx="minor"/>
-      </dsp:style>
-      <dsp:txBody>
-        <a:bodyPr spcFirstLastPara="0" vert="horz" wrap="square" lIns="156464" tIns="13970" rIns="13970" bIns="13970" numCol="1" spcCol="1270" anchor="ctr" anchorCtr="0">
-          <a:noAutofit/>
-        </a:bodyPr>
-        <a:lstStyle/>
-        <a:p>
-          <a:pPr marL="228600" lvl="1" indent="-228600" algn="l" defTabSz="977900">
-            <a:lnSpc>
-              <a:spcPct val="90000"/>
-            </a:lnSpc>
-            <a:spcBef>
-              <a:spcPct val="0"/>
-            </a:spcBef>
-            <a:spcAft>
-              <a:spcPct val="15000"/>
-            </a:spcAft>
-            <a:buChar char="••"/>
-          </a:pPr>
-          <a:r>
-            <a:rPr lang="fr-FR" sz="2200" kern="1200" dirty="0" smtClean="0"/>
-            <a:t>Non réalisé</a:t>
-          </a:r>
-          <a:endParaRPr lang="fr-FR" sz="2200" kern="1200" dirty="0"/>
-        </a:p>
-      </dsp:txBody>
-      <dsp:txXfrm rot="-5400000">
-        <a:off x="846886" y="3227824"/>
-        <a:ext cx="7639194" cy="709616"/>
-      </dsp:txXfrm>
-    </dsp:sp>
   </dsp:spTree>
 </dsp:drawing>
 </file>
@@ -7373,698 +6055,6 @@
       <dsp:cNvGrpSpPr/>
     </dsp:nvGrpSpPr>
     <dsp:grpSpPr/>
-    <dsp:sp modelId="{F80C65A5-3674-41F2-A631-E961E873F666}">
-      <dsp:nvSpPr>
-        <dsp:cNvPr id="0" name=""/>
-        <dsp:cNvSpPr/>
-      </dsp:nvSpPr>
-      <dsp:spPr>
-        <a:xfrm rot="5400000">
-          <a:off x="-181475" y="183176"/>
-          <a:ext cx="1209837" cy="846886"/>
-        </a:xfrm>
-        <a:prstGeom prst="chevron">
-          <a:avLst/>
-        </a:prstGeom>
-        <a:solidFill>
-          <a:schemeClr val="accent2">
-            <a:hueOff val="0"/>
-            <a:satOff val="0"/>
-            <a:lumOff val="0"/>
-            <a:alphaOff val="0"/>
-          </a:schemeClr>
-        </a:solidFill>
-        <a:ln w="15875" cap="flat" cmpd="sng" algn="ctr">
-          <a:solidFill>
-            <a:schemeClr val="accent2">
-              <a:hueOff val="0"/>
-              <a:satOff val="0"/>
-              <a:lumOff val="0"/>
-              <a:alphaOff val="0"/>
-            </a:schemeClr>
-          </a:solidFill>
-          <a:prstDash val="solid"/>
-        </a:ln>
-        <a:effectLst/>
-      </dsp:spPr>
-      <dsp:style>
-        <a:lnRef idx="2">
-          <a:scrgbClr r="0" g="0" b="0"/>
-        </a:lnRef>
-        <a:fillRef idx="1">
-          <a:scrgbClr r="0" g="0" b="0"/>
-        </a:fillRef>
-        <a:effectRef idx="0">
-          <a:scrgbClr r="0" g="0" b="0"/>
-        </a:effectRef>
-        <a:fontRef idx="minor">
-          <a:schemeClr val="lt1"/>
-        </a:fontRef>
-      </dsp:style>
-      <dsp:txBody>
-        <a:bodyPr spcFirstLastPara="0" vert="horz" wrap="square" lIns="12700" tIns="12700" rIns="12700" bIns="12700" numCol="1" spcCol="1270" anchor="ctr" anchorCtr="0">
-          <a:noAutofit/>
-        </a:bodyPr>
-        <a:lstStyle/>
-        <a:p>
-          <a:pPr lvl="0" algn="ctr" defTabSz="889000">
-            <a:lnSpc>
-              <a:spcPct val="90000"/>
-            </a:lnSpc>
-            <a:spcBef>
-              <a:spcPct val="0"/>
-            </a:spcBef>
-            <a:spcAft>
-              <a:spcPct val="35000"/>
-            </a:spcAft>
-          </a:pPr>
-          <a:r>
-            <a:rPr lang="fr-FR" sz="2000" kern="1200" dirty="0" smtClean="0"/>
-            <a:t>Sprint 0</a:t>
-          </a:r>
-          <a:endParaRPr lang="fr-FR" sz="2000" kern="1200" dirty="0"/>
-        </a:p>
-      </dsp:txBody>
-      <dsp:txXfrm rot="-5400000">
-        <a:off x="1" y="425143"/>
-        <a:ext cx="846886" cy="362951"/>
-      </dsp:txXfrm>
-    </dsp:sp>
-    <dsp:sp modelId="{39D7EDD9-031A-47C8-8B3A-1230B0D4063A}">
-      <dsp:nvSpPr>
-        <dsp:cNvPr id="0" name=""/>
-        <dsp:cNvSpPr/>
-      </dsp:nvSpPr>
-      <dsp:spPr>
-        <a:xfrm rot="5400000">
-          <a:off x="4292480" y="-3443894"/>
-          <a:ext cx="786394" cy="7677583"/>
-        </a:xfrm>
-        <a:prstGeom prst="round2SameRect">
-          <a:avLst/>
-        </a:prstGeom>
-        <a:solidFill>
-          <a:schemeClr val="lt1">
-            <a:alpha val="90000"/>
-            <a:hueOff val="0"/>
-            <a:satOff val="0"/>
-            <a:lumOff val="0"/>
-            <a:alphaOff val="0"/>
-          </a:schemeClr>
-        </a:solidFill>
-        <a:ln w="15875" cap="flat" cmpd="sng" algn="ctr">
-          <a:solidFill>
-            <a:schemeClr val="accent2">
-              <a:hueOff val="0"/>
-              <a:satOff val="0"/>
-              <a:lumOff val="0"/>
-              <a:alphaOff val="0"/>
-            </a:schemeClr>
-          </a:solidFill>
-          <a:prstDash val="solid"/>
-        </a:ln>
-        <a:effectLst/>
-      </dsp:spPr>
-      <dsp:style>
-        <a:lnRef idx="2">
-          <a:scrgbClr r="0" g="0" b="0"/>
-        </a:lnRef>
-        <a:fillRef idx="1">
-          <a:scrgbClr r="0" g="0" b="0"/>
-        </a:fillRef>
-        <a:effectRef idx="0">
-          <a:scrgbClr r="0" g="0" b="0"/>
-        </a:effectRef>
-        <a:fontRef idx="minor"/>
-      </dsp:style>
-      <dsp:txBody>
-        <a:bodyPr spcFirstLastPara="0" vert="horz" wrap="square" lIns="156464" tIns="13970" rIns="13970" bIns="13970" numCol="1" spcCol="1270" anchor="ctr" anchorCtr="0">
-          <a:noAutofit/>
-        </a:bodyPr>
-        <a:lstStyle/>
-        <a:p>
-          <a:pPr marL="228600" lvl="1" indent="-228600" algn="l" defTabSz="977900">
-            <a:lnSpc>
-              <a:spcPct val="90000"/>
-            </a:lnSpc>
-            <a:spcBef>
-              <a:spcPct val="0"/>
-            </a:spcBef>
-            <a:spcAft>
-              <a:spcPct val="15000"/>
-            </a:spcAft>
-            <a:buChar char="••"/>
-          </a:pPr>
-          <a:r>
-            <a:rPr lang="fr-FR" sz="2200" kern="1200" dirty="0" smtClean="0"/>
-            <a:t>Compréhension du sujet</a:t>
-          </a:r>
-          <a:endParaRPr lang="fr-FR" sz="2200" kern="1200" dirty="0"/>
-        </a:p>
-        <a:p>
-          <a:pPr marL="228600" lvl="1" indent="-228600" algn="l" defTabSz="977900">
-            <a:lnSpc>
-              <a:spcPct val="90000"/>
-            </a:lnSpc>
-            <a:spcBef>
-              <a:spcPct val="0"/>
-            </a:spcBef>
-            <a:spcAft>
-              <a:spcPct val="15000"/>
-            </a:spcAft>
-            <a:buChar char="••"/>
-          </a:pPr>
-          <a:r>
-            <a:rPr lang="fr-FR" sz="2200" kern="1200" dirty="0" smtClean="0"/>
-            <a:t>Diagramme des classes</a:t>
-          </a:r>
-          <a:endParaRPr lang="fr-FR" sz="2200" kern="1200" dirty="0"/>
-        </a:p>
-      </dsp:txBody>
-      <dsp:txXfrm rot="-5400000">
-        <a:off x="846886" y="40089"/>
-        <a:ext cx="7639194" cy="709616"/>
-      </dsp:txXfrm>
-    </dsp:sp>
-    <dsp:sp modelId="{546D62F4-D67F-4A18-8368-4ACFA371B101}">
-      <dsp:nvSpPr>
-        <dsp:cNvPr id="0" name=""/>
-        <dsp:cNvSpPr/>
-      </dsp:nvSpPr>
-      <dsp:spPr>
-        <a:xfrm rot="5400000">
-          <a:off x="-181475" y="1245754"/>
-          <a:ext cx="1209837" cy="846886"/>
-        </a:xfrm>
-        <a:prstGeom prst="chevron">
-          <a:avLst/>
-        </a:prstGeom>
-        <a:solidFill>
-          <a:schemeClr val="accent2">
-            <a:hueOff val="-903533"/>
-            <a:satOff val="0"/>
-            <a:lumOff val="0"/>
-            <a:alphaOff val="0"/>
-          </a:schemeClr>
-        </a:solidFill>
-        <a:ln w="15875" cap="flat" cmpd="sng" algn="ctr">
-          <a:solidFill>
-            <a:schemeClr val="accent2">
-              <a:hueOff val="-903533"/>
-              <a:satOff val="0"/>
-              <a:lumOff val="0"/>
-              <a:alphaOff val="0"/>
-            </a:schemeClr>
-          </a:solidFill>
-          <a:prstDash val="solid"/>
-        </a:ln>
-        <a:effectLst/>
-      </dsp:spPr>
-      <dsp:style>
-        <a:lnRef idx="2">
-          <a:scrgbClr r="0" g="0" b="0"/>
-        </a:lnRef>
-        <a:fillRef idx="1">
-          <a:scrgbClr r="0" g="0" b="0"/>
-        </a:fillRef>
-        <a:effectRef idx="0">
-          <a:scrgbClr r="0" g="0" b="0"/>
-        </a:effectRef>
-        <a:fontRef idx="minor">
-          <a:schemeClr val="lt1"/>
-        </a:fontRef>
-      </dsp:style>
-      <dsp:txBody>
-        <a:bodyPr spcFirstLastPara="0" vert="horz" wrap="square" lIns="12700" tIns="12700" rIns="12700" bIns="12700" numCol="1" spcCol="1270" anchor="ctr" anchorCtr="0">
-          <a:noAutofit/>
-        </a:bodyPr>
-        <a:lstStyle/>
-        <a:p>
-          <a:pPr lvl="0" algn="ctr" defTabSz="889000">
-            <a:lnSpc>
-              <a:spcPct val="90000"/>
-            </a:lnSpc>
-            <a:spcBef>
-              <a:spcPct val="0"/>
-            </a:spcBef>
-            <a:spcAft>
-              <a:spcPct val="35000"/>
-            </a:spcAft>
-          </a:pPr>
-          <a:r>
-            <a:rPr lang="fr-FR" sz="2000" kern="1200" dirty="0" smtClean="0"/>
-            <a:t>Sprint 1</a:t>
-          </a:r>
-          <a:endParaRPr lang="fr-FR" sz="2000" kern="1200" dirty="0"/>
-        </a:p>
-      </dsp:txBody>
-      <dsp:txXfrm rot="-5400000">
-        <a:off x="1" y="1487721"/>
-        <a:ext cx="846886" cy="362951"/>
-      </dsp:txXfrm>
-    </dsp:sp>
-    <dsp:sp modelId="{DADE07FF-1CDA-4989-876E-7701F568B959}">
-      <dsp:nvSpPr>
-        <dsp:cNvPr id="0" name=""/>
-        <dsp:cNvSpPr/>
-      </dsp:nvSpPr>
-      <dsp:spPr>
-        <a:xfrm rot="5400000">
-          <a:off x="4292480" y="-2381315"/>
-          <a:ext cx="786394" cy="7677583"/>
-        </a:xfrm>
-        <a:prstGeom prst="round2SameRect">
-          <a:avLst/>
-        </a:prstGeom>
-        <a:solidFill>
-          <a:schemeClr val="lt1">
-            <a:alpha val="90000"/>
-            <a:hueOff val="0"/>
-            <a:satOff val="0"/>
-            <a:lumOff val="0"/>
-            <a:alphaOff val="0"/>
-          </a:schemeClr>
-        </a:solidFill>
-        <a:ln w="15875" cap="flat" cmpd="sng" algn="ctr">
-          <a:solidFill>
-            <a:schemeClr val="accent2">
-              <a:hueOff val="-903533"/>
-              <a:satOff val="0"/>
-              <a:lumOff val="0"/>
-              <a:alphaOff val="0"/>
-            </a:schemeClr>
-          </a:solidFill>
-          <a:prstDash val="solid"/>
-        </a:ln>
-        <a:effectLst/>
-      </dsp:spPr>
-      <dsp:style>
-        <a:lnRef idx="2">
-          <a:scrgbClr r="0" g="0" b="0"/>
-        </a:lnRef>
-        <a:fillRef idx="1">
-          <a:scrgbClr r="0" g="0" b="0"/>
-        </a:fillRef>
-        <a:effectRef idx="0">
-          <a:scrgbClr r="0" g="0" b="0"/>
-        </a:effectRef>
-        <a:fontRef idx="minor"/>
-      </dsp:style>
-      <dsp:txBody>
-        <a:bodyPr spcFirstLastPara="0" vert="horz" wrap="square" lIns="156464" tIns="13970" rIns="13970" bIns="13970" numCol="1" spcCol="1270" anchor="ctr" anchorCtr="0">
-          <a:noAutofit/>
-        </a:bodyPr>
-        <a:lstStyle/>
-        <a:p>
-          <a:pPr marL="228600" lvl="1" indent="-228600" algn="l" defTabSz="977900">
-            <a:lnSpc>
-              <a:spcPct val="90000"/>
-            </a:lnSpc>
-            <a:spcBef>
-              <a:spcPct val="0"/>
-            </a:spcBef>
-            <a:spcAft>
-              <a:spcPct val="15000"/>
-            </a:spcAft>
-            <a:buChar char="••"/>
-          </a:pPr>
-          <a:r>
-            <a:rPr lang="fr-FR" sz="2200" kern="1200" dirty="0" smtClean="0"/>
-            <a:t>Mise en place des classes</a:t>
-          </a:r>
-          <a:endParaRPr lang="fr-FR" sz="2200" kern="1200" dirty="0"/>
-        </a:p>
-        <a:p>
-          <a:pPr marL="228600" lvl="1" indent="-228600" algn="l" defTabSz="977900">
-            <a:lnSpc>
-              <a:spcPct val="90000"/>
-            </a:lnSpc>
-            <a:spcBef>
-              <a:spcPct val="0"/>
-            </a:spcBef>
-            <a:spcAft>
-              <a:spcPct val="15000"/>
-            </a:spcAft>
-            <a:buChar char="••"/>
-          </a:pPr>
-          <a:r>
-            <a:rPr lang="fr-FR" sz="2200" kern="1200" dirty="0" smtClean="0"/>
-            <a:t>Débogage des classes</a:t>
-          </a:r>
-          <a:endParaRPr lang="fr-FR" sz="2200" kern="1200" dirty="0"/>
-        </a:p>
-      </dsp:txBody>
-      <dsp:txXfrm rot="-5400000">
-        <a:off x="846886" y="1102668"/>
-        <a:ext cx="7639194" cy="709616"/>
-      </dsp:txXfrm>
-    </dsp:sp>
-    <dsp:sp modelId="{42F6DD47-9CDD-4CFD-988A-E80234CBD3CB}">
-      <dsp:nvSpPr>
-        <dsp:cNvPr id="0" name=""/>
-        <dsp:cNvSpPr/>
-      </dsp:nvSpPr>
-      <dsp:spPr>
-        <a:xfrm rot="5400000">
-          <a:off x="-181475" y="2308332"/>
-          <a:ext cx="1209837" cy="846886"/>
-        </a:xfrm>
-        <a:prstGeom prst="chevron">
-          <a:avLst/>
-        </a:prstGeom>
-        <a:solidFill>
-          <a:schemeClr val="accent2">
-            <a:hueOff val="-1807066"/>
-            <a:satOff val="0"/>
-            <a:lumOff val="0"/>
-            <a:alphaOff val="0"/>
-          </a:schemeClr>
-        </a:solidFill>
-        <a:ln w="15875" cap="flat" cmpd="sng" algn="ctr">
-          <a:solidFill>
-            <a:schemeClr val="accent2">
-              <a:hueOff val="-1807066"/>
-              <a:satOff val="0"/>
-              <a:lumOff val="0"/>
-              <a:alphaOff val="0"/>
-            </a:schemeClr>
-          </a:solidFill>
-          <a:prstDash val="solid"/>
-        </a:ln>
-        <a:effectLst/>
-      </dsp:spPr>
-      <dsp:style>
-        <a:lnRef idx="2">
-          <a:scrgbClr r="0" g="0" b="0"/>
-        </a:lnRef>
-        <a:fillRef idx="1">
-          <a:scrgbClr r="0" g="0" b="0"/>
-        </a:fillRef>
-        <a:effectRef idx="0">
-          <a:scrgbClr r="0" g="0" b="0"/>
-        </a:effectRef>
-        <a:fontRef idx="minor">
-          <a:schemeClr val="lt1"/>
-        </a:fontRef>
-      </dsp:style>
-      <dsp:txBody>
-        <a:bodyPr spcFirstLastPara="0" vert="horz" wrap="square" lIns="12700" tIns="12700" rIns="12700" bIns="12700" numCol="1" spcCol="1270" anchor="ctr" anchorCtr="0">
-          <a:noAutofit/>
-        </a:bodyPr>
-        <a:lstStyle/>
-        <a:p>
-          <a:pPr lvl="0" algn="ctr" defTabSz="889000">
-            <a:lnSpc>
-              <a:spcPct val="90000"/>
-            </a:lnSpc>
-            <a:spcBef>
-              <a:spcPct val="0"/>
-            </a:spcBef>
-            <a:spcAft>
-              <a:spcPct val="35000"/>
-            </a:spcAft>
-          </a:pPr>
-          <a:r>
-            <a:rPr lang="fr-FR" sz="2000" kern="1200" dirty="0" smtClean="0"/>
-            <a:t>Sprint 2</a:t>
-          </a:r>
-          <a:endParaRPr lang="fr-FR" sz="2000" kern="1200" dirty="0"/>
-        </a:p>
-      </dsp:txBody>
-      <dsp:txXfrm rot="-5400000">
-        <a:off x="1" y="2550299"/>
-        <a:ext cx="846886" cy="362951"/>
-      </dsp:txXfrm>
-    </dsp:sp>
-    <dsp:sp modelId="{5B93D43C-5124-4D00-A8CB-11DF4948966A}">
-      <dsp:nvSpPr>
-        <dsp:cNvPr id="0" name=""/>
-        <dsp:cNvSpPr/>
-      </dsp:nvSpPr>
-      <dsp:spPr>
-        <a:xfrm rot="5400000">
-          <a:off x="4292480" y="-1318737"/>
-          <a:ext cx="786394" cy="7677583"/>
-        </a:xfrm>
-        <a:prstGeom prst="round2SameRect">
-          <a:avLst/>
-        </a:prstGeom>
-        <a:solidFill>
-          <a:schemeClr val="lt1">
-            <a:alpha val="90000"/>
-            <a:hueOff val="0"/>
-            <a:satOff val="0"/>
-            <a:lumOff val="0"/>
-            <a:alphaOff val="0"/>
-          </a:schemeClr>
-        </a:solidFill>
-        <a:ln w="15875" cap="flat" cmpd="sng" algn="ctr">
-          <a:solidFill>
-            <a:schemeClr val="accent2">
-              <a:hueOff val="-1807066"/>
-              <a:satOff val="0"/>
-              <a:lumOff val="0"/>
-              <a:alphaOff val="0"/>
-            </a:schemeClr>
-          </a:solidFill>
-          <a:prstDash val="solid"/>
-        </a:ln>
-        <a:effectLst/>
-      </dsp:spPr>
-      <dsp:style>
-        <a:lnRef idx="2">
-          <a:scrgbClr r="0" g="0" b="0"/>
-        </a:lnRef>
-        <a:fillRef idx="1">
-          <a:scrgbClr r="0" g="0" b="0"/>
-        </a:fillRef>
-        <a:effectRef idx="0">
-          <a:scrgbClr r="0" g="0" b="0"/>
-        </a:effectRef>
-        <a:fontRef idx="minor"/>
-      </dsp:style>
-      <dsp:txBody>
-        <a:bodyPr spcFirstLastPara="0" vert="horz" wrap="square" lIns="156464" tIns="13970" rIns="13970" bIns="13970" numCol="1" spcCol="1270" anchor="ctr" anchorCtr="0">
-          <a:noAutofit/>
-        </a:bodyPr>
-        <a:lstStyle/>
-        <a:p>
-          <a:pPr marL="228600" lvl="1" indent="-228600" algn="l" defTabSz="977900">
-            <a:lnSpc>
-              <a:spcPct val="90000"/>
-            </a:lnSpc>
-            <a:spcBef>
-              <a:spcPct val="0"/>
-            </a:spcBef>
-            <a:spcAft>
-              <a:spcPct val="15000"/>
-            </a:spcAft>
-            <a:buChar char="••"/>
-          </a:pPr>
-          <a:r>
-            <a:rPr lang="fr-FR" sz="2200" kern="1200" dirty="0" smtClean="0"/>
-            <a:t>Intégration du calendrier</a:t>
-          </a:r>
-          <a:endParaRPr lang="fr-FR" sz="2200" kern="1200" dirty="0"/>
-        </a:p>
-        <a:p>
-          <a:pPr marL="228600" lvl="1" indent="-228600" algn="l" defTabSz="977900">
-            <a:lnSpc>
-              <a:spcPct val="90000"/>
-            </a:lnSpc>
-            <a:spcBef>
-              <a:spcPct val="0"/>
-            </a:spcBef>
-            <a:spcAft>
-              <a:spcPct val="15000"/>
-            </a:spcAft>
-            <a:buChar char="••"/>
-          </a:pPr>
-          <a:r>
-            <a:rPr lang="fr-FR" sz="2200" kern="1200" dirty="0" smtClean="0"/>
-            <a:t>Lien avec la base de donnée</a:t>
-          </a:r>
-          <a:endParaRPr lang="fr-FR" sz="2200" kern="1200" dirty="0"/>
-        </a:p>
-      </dsp:txBody>
-      <dsp:txXfrm rot="-5400000">
-        <a:off x="846886" y="2165246"/>
-        <a:ext cx="7639194" cy="709616"/>
-      </dsp:txXfrm>
-    </dsp:sp>
-    <dsp:sp modelId="{D57F4918-6091-43D4-8FE1-210AC6412E38}">
-      <dsp:nvSpPr>
-        <dsp:cNvPr id="0" name=""/>
-        <dsp:cNvSpPr/>
-      </dsp:nvSpPr>
-      <dsp:spPr>
-        <a:xfrm rot="5400000">
-          <a:off x="-181475" y="3370910"/>
-          <a:ext cx="1209837" cy="846886"/>
-        </a:xfrm>
-        <a:prstGeom prst="chevron">
-          <a:avLst/>
-        </a:prstGeom>
-        <a:solidFill>
-          <a:schemeClr val="accent2">
-            <a:hueOff val="-2710599"/>
-            <a:satOff val="0"/>
-            <a:lumOff val="0"/>
-            <a:alphaOff val="0"/>
-          </a:schemeClr>
-        </a:solidFill>
-        <a:ln w="15875" cap="flat" cmpd="sng" algn="ctr">
-          <a:solidFill>
-            <a:schemeClr val="accent2">
-              <a:hueOff val="-2710599"/>
-              <a:satOff val="0"/>
-              <a:lumOff val="0"/>
-              <a:alphaOff val="0"/>
-            </a:schemeClr>
-          </a:solidFill>
-          <a:prstDash val="solid"/>
-        </a:ln>
-        <a:effectLst/>
-      </dsp:spPr>
-      <dsp:style>
-        <a:lnRef idx="2">
-          <a:scrgbClr r="0" g="0" b="0"/>
-        </a:lnRef>
-        <a:fillRef idx="1">
-          <a:scrgbClr r="0" g="0" b="0"/>
-        </a:fillRef>
-        <a:effectRef idx="0">
-          <a:scrgbClr r="0" g="0" b="0"/>
-        </a:effectRef>
-        <a:fontRef idx="minor">
-          <a:schemeClr val="lt1"/>
-        </a:fontRef>
-      </dsp:style>
-      <dsp:txBody>
-        <a:bodyPr spcFirstLastPara="0" vert="horz" wrap="square" lIns="12700" tIns="12700" rIns="12700" bIns="12700" numCol="1" spcCol="1270" anchor="ctr" anchorCtr="0">
-          <a:noAutofit/>
-        </a:bodyPr>
-        <a:lstStyle/>
-        <a:p>
-          <a:pPr lvl="0" algn="ctr" defTabSz="889000">
-            <a:lnSpc>
-              <a:spcPct val="90000"/>
-            </a:lnSpc>
-            <a:spcBef>
-              <a:spcPct val="0"/>
-            </a:spcBef>
-            <a:spcAft>
-              <a:spcPct val="35000"/>
-            </a:spcAft>
-          </a:pPr>
-          <a:r>
-            <a:rPr lang="fr-FR" sz="2000" kern="1200" dirty="0" smtClean="0"/>
-            <a:t>Sprint 3</a:t>
-          </a:r>
-          <a:endParaRPr lang="fr-FR" sz="2000" kern="1200" dirty="0"/>
-        </a:p>
-      </dsp:txBody>
-      <dsp:txXfrm rot="-5400000">
-        <a:off x="1" y="3612877"/>
-        <a:ext cx="846886" cy="362951"/>
-      </dsp:txXfrm>
-    </dsp:sp>
-    <dsp:sp modelId="{304BBC03-2D4B-4C5B-80A6-B9C7D830CBFA}">
-      <dsp:nvSpPr>
-        <dsp:cNvPr id="0" name=""/>
-        <dsp:cNvSpPr/>
-      </dsp:nvSpPr>
-      <dsp:spPr>
-        <a:xfrm rot="5400000">
-          <a:off x="4292480" y="-256159"/>
-          <a:ext cx="786394" cy="7677583"/>
-        </a:xfrm>
-        <a:prstGeom prst="round2SameRect">
-          <a:avLst/>
-        </a:prstGeom>
-        <a:solidFill>
-          <a:schemeClr val="lt1">
-            <a:alpha val="90000"/>
-            <a:hueOff val="0"/>
-            <a:satOff val="0"/>
-            <a:lumOff val="0"/>
-            <a:alphaOff val="0"/>
-          </a:schemeClr>
-        </a:solidFill>
-        <a:ln w="15875" cap="flat" cmpd="sng" algn="ctr">
-          <a:solidFill>
-            <a:schemeClr val="accent2">
-              <a:hueOff val="-2710599"/>
-              <a:satOff val="0"/>
-              <a:lumOff val="0"/>
-              <a:alphaOff val="0"/>
-            </a:schemeClr>
-          </a:solidFill>
-          <a:prstDash val="solid"/>
-        </a:ln>
-        <a:effectLst/>
-      </dsp:spPr>
-      <dsp:style>
-        <a:lnRef idx="2">
-          <a:scrgbClr r="0" g="0" b="0"/>
-        </a:lnRef>
-        <a:fillRef idx="1">
-          <a:scrgbClr r="0" g="0" b="0"/>
-        </a:fillRef>
-        <a:effectRef idx="0">
-          <a:scrgbClr r="0" g="0" b="0"/>
-        </a:effectRef>
-        <a:fontRef idx="minor"/>
-      </dsp:style>
-      <dsp:txBody>
-        <a:bodyPr spcFirstLastPara="0" vert="horz" wrap="square" lIns="156464" tIns="13970" rIns="13970" bIns="13970" numCol="1" spcCol="1270" anchor="ctr" anchorCtr="0">
-          <a:noAutofit/>
-        </a:bodyPr>
-        <a:lstStyle/>
-        <a:p>
-          <a:pPr marL="228600" lvl="1" indent="-228600" algn="l" defTabSz="977900">
-            <a:lnSpc>
-              <a:spcPct val="90000"/>
-            </a:lnSpc>
-            <a:spcBef>
-              <a:spcPct val="0"/>
-            </a:spcBef>
-            <a:spcAft>
-              <a:spcPct val="15000"/>
-            </a:spcAft>
-            <a:buChar char="••"/>
-          </a:pPr>
-          <a:r>
-            <a:rPr lang="fr-FR" sz="2200" kern="1200" dirty="0" smtClean="0"/>
-            <a:t>Rajout du module d’authentification</a:t>
-          </a:r>
-          <a:endParaRPr lang="fr-FR" sz="2200" kern="1200" dirty="0"/>
-        </a:p>
-        <a:p>
-          <a:pPr marL="228600" lvl="1" indent="-228600" algn="l" defTabSz="977900">
-            <a:lnSpc>
-              <a:spcPct val="90000"/>
-            </a:lnSpc>
-            <a:spcBef>
-              <a:spcPct val="0"/>
-            </a:spcBef>
-            <a:spcAft>
-              <a:spcPct val="15000"/>
-            </a:spcAft>
-            <a:buChar char="••"/>
-          </a:pPr>
-          <a:r>
-            <a:rPr lang="fr-FR" sz="2200" kern="1200" dirty="0" smtClean="0"/>
-            <a:t>Niveaux de sécurité</a:t>
-          </a:r>
-          <a:endParaRPr lang="fr-FR" sz="2200" kern="1200" dirty="0"/>
-        </a:p>
-      </dsp:txBody>
-      <dsp:txXfrm rot="-5400000">
-        <a:off x="846886" y="3227824"/>
-        <a:ext cx="7639194" cy="709616"/>
-      </dsp:txXfrm>
-    </dsp:sp>
   </dsp:spTree>
 </dsp:drawing>
 </file>
@@ -8077,757 +6067,6 @@
       <dsp:cNvGrpSpPr/>
     </dsp:nvGrpSpPr>
     <dsp:grpSpPr/>
-    <dsp:sp modelId="{D8DCDB59-09B4-4DAC-8E99-2D2560692E58}">
-      <dsp:nvSpPr>
-        <dsp:cNvPr id="0" name=""/>
-        <dsp:cNvSpPr/>
-      </dsp:nvSpPr>
-      <dsp:spPr>
-        <a:xfrm>
-          <a:off x="2418062" y="1713"/>
-          <a:ext cx="1450377" cy="942745"/>
-        </a:xfrm>
-        <a:prstGeom prst="roundRect">
-          <a:avLst/>
-        </a:prstGeom>
-        <a:solidFill>
-          <a:schemeClr val="accent2">
-            <a:hueOff val="0"/>
-            <a:satOff val="0"/>
-            <a:lumOff val="0"/>
-            <a:alphaOff val="0"/>
-          </a:schemeClr>
-        </a:solidFill>
-        <a:ln w="15875" cap="flat" cmpd="sng" algn="ctr">
-          <a:solidFill>
-            <a:schemeClr val="lt1">
-              <a:hueOff val="0"/>
-              <a:satOff val="0"/>
-              <a:lumOff val="0"/>
-              <a:alphaOff val="0"/>
-            </a:schemeClr>
-          </a:solidFill>
-          <a:prstDash val="solid"/>
-        </a:ln>
-        <a:effectLst/>
-      </dsp:spPr>
-      <dsp:style>
-        <a:lnRef idx="2">
-          <a:scrgbClr r="0" g="0" b="0"/>
-        </a:lnRef>
-        <a:fillRef idx="1">
-          <a:scrgbClr r="0" g="0" b="0"/>
-        </a:fillRef>
-        <a:effectRef idx="0">
-          <a:scrgbClr r="0" g="0" b="0"/>
-        </a:effectRef>
-        <a:fontRef idx="minor">
-          <a:schemeClr val="lt1"/>
-        </a:fontRef>
-      </dsp:style>
-      <dsp:txBody>
-        <a:bodyPr spcFirstLastPara="0" vert="horz" wrap="square" lIns="53340" tIns="53340" rIns="53340" bIns="53340" numCol="1" spcCol="1270" anchor="ctr" anchorCtr="0">
-          <a:noAutofit/>
-        </a:bodyPr>
-        <a:lstStyle/>
-        <a:p>
-          <a:pPr lvl="0" algn="ctr" defTabSz="622300">
-            <a:lnSpc>
-              <a:spcPct val="90000"/>
-            </a:lnSpc>
-            <a:spcBef>
-              <a:spcPct val="0"/>
-            </a:spcBef>
-            <a:spcAft>
-              <a:spcPct val="35000"/>
-            </a:spcAft>
-          </a:pPr>
-          <a:r>
-            <a:rPr lang="fr-FR" sz="1400" b="0" kern="1200" dirty="0" smtClean="0"/>
-            <a:t>Etape 1 : </a:t>
-          </a:r>
-        </a:p>
-        <a:p>
-          <a:pPr lvl="0" algn="ctr" defTabSz="622300">
-            <a:lnSpc>
-              <a:spcPct val="90000"/>
-            </a:lnSpc>
-            <a:spcBef>
-              <a:spcPct val="0"/>
-            </a:spcBef>
-            <a:spcAft>
-              <a:spcPct val="35000"/>
-            </a:spcAft>
-          </a:pPr>
-          <a:r>
-            <a:rPr lang="fr-FR" sz="1400" b="0" kern="1200" dirty="0" smtClean="0"/>
-            <a:t>Authentification </a:t>
-          </a:r>
-          <a:endParaRPr lang="fr-FR" sz="1400" b="0" kern="1200" dirty="0"/>
-        </a:p>
-      </dsp:txBody>
-      <dsp:txXfrm>
-        <a:off x="2464083" y="47734"/>
-        <a:ext cx="1358335" cy="850703"/>
-      </dsp:txXfrm>
-    </dsp:sp>
-    <dsp:sp modelId="{C6B67350-5ED4-48B1-93EC-0CEE1D6AB978}">
-      <dsp:nvSpPr>
-        <dsp:cNvPr id="0" name=""/>
-        <dsp:cNvSpPr/>
-      </dsp:nvSpPr>
-      <dsp:spPr>
-        <a:xfrm>
-          <a:off x="1262200" y="474166"/>
-          <a:ext cx="3767293" cy="3767293"/>
-        </a:xfrm>
-        <a:custGeom>
-          <a:avLst/>
-          <a:gdLst/>
-          <a:ahLst/>
-          <a:cxnLst/>
-          <a:rect l="0" t="0" r="0" b="0"/>
-          <a:pathLst>
-            <a:path>
-              <a:moveTo>
-                <a:pt x="2813331" y="245412"/>
-              </a:moveTo>
-              <a:arcTo wR="1883646" hR="1883646" stAng="17974475" swAng="1297396"/>
-            </a:path>
-          </a:pathLst>
-        </a:custGeom>
-        <a:noFill/>
-        <a:ln w="12700" cap="flat" cmpd="sng" algn="ctr">
-          <a:solidFill>
-            <a:schemeClr val="accent2">
-              <a:hueOff val="0"/>
-              <a:satOff val="0"/>
-              <a:lumOff val="0"/>
-              <a:alphaOff val="0"/>
-            </a:schemeClr>
-          </a:solidFill>
-          <a:prstDash val="solid"/>
-          <a:tailEnd type="arrow"/>
-        </a:ln>
-        <a:effectLst/>
-      </dsp:spPr>
-      <dsp:style>
-        <a:lnRef idx="1">
-          <a:scrgbClr r="0" g="0" b="0"/>
-        </a:lnRef>
-        <a:fillRef idx="0">
-          <a:scrgbClr r="0" g="0" b="0"/>
-        </a:fillRef>
-        <a:effectRef idx="0">
-          <a:scrgbClr r="0" g="0" b="0"/>
-        </a:effectRef>
-        <a:fontRef idx="minor"/>
-      </dsp:style>
-    </dsp:sp>
-    <dsp:sp modelId="{27BFAB88-7517-47A8-BBB6-AC8298F1FACC}">
-      <dsp:nvSpPr>
-        <dsp:cNvPr id="0" name=""/>
-        <dsp:cNvSpPr/>
-      </dsp:nvSpPr>
-      <dsp:spPr>
-        <a:xfrm>
-          <a:off x="4230292" y="1365626"/>
-          <a:ext cx="1450377" cy="942745"/>
-        </a:xfrm>
-        <a:prstGeom prst="roundRect">
-          <a:avLst/>
-        </a:prstGeom>
-        <a:solidFill>
-          <a:schemeClr val="accent3">
-            <a:hueOff val="0"/>
-            <a:satOff val="0"/>
-            <a:lumOff val="0"/>
-            <a:alphaOff val="0"/>
-          </a:schemeClr>
-        </a:solidFill>
-        <a:ln w="15875" cap="flat" cmpd="sng" algn="ctr">
-          <a:solidFill>
-            <a:schemeClr val="lt1">
-              <a:hueOff val="0"/>
-              <a:satOff val="0"/>
-              <a:lumOff val="0"/>
-              <a:alphaOff val="0"/>
-            </a:schemeClr>
-          </a:solidFill>
-          <a:prstDash val="solid"/>
-        </a:ln>
-        <a:effectLst/>
-      </dsp:spPr>
-      <dsp:style>
-        <a:lnRef idx="2">
-          <a:scrgbClr r="0" g="0" b="0"/>
-        </a:lnRef>
-        <a:fillRef idx="1">
-          <a:scrgbClr r="0" g="0" b="0"/>
-        </a:fillRef>
-        <a:effectRef idx="0">
-          <a:scrgbClr r="0" g="0" b="0"/>
-        </a:effectRef>
-        <a:fontRef idx="minor">
-          <a:schemeClr val="lt1"/>
-        </a:fontRef>
-      </dsp:style>
-      <dsp:txBody>
-        <a:bodyPr spcFirstLastPara="0" vert="horz" wrap="square" lIns="53340" tIns="53340" rIns="53340" bIns="53340" numCol="1" spcCol="1270" anchor="ctr" anchorCtr="0">
-          <a:noAutofit/>
-        </a:bodyPr>
-        <a:lstStyle/>
-        <a:p>
-          <a:pPr lvl="0" algn="ctr" defTabSz="622300">
-            <a:lnSpc>
-              <a:spcPct val="90000"/>
-            </a:lnSpc>
-            <a:spcBef>
-              <a:spcPct val="0"/>
-            </a:spcBef>
-            <a:spcAft>
-              <a:spcPct val="35000"/>
-            </a:spcAft>
-          </a:pPr>
-          <a:r>
-            <a:rPr lang="fr-FR" sz="1400" b="0" kern="1200" dirty="0" smtClean="0"/>
-            <a:t>Etape 2 : </a:t>
-          </a:r>
-        </a:p>
-        <a:p>
-          <a:pPr lvl="0" algn="ctr" defTabSz="622300">
-            <a:lnSpc>
-              <a:spcPct val="90000"/>
-            </a:lnSpc>
-            <a:spcBef>
-              <a:spcPct val="0"/>
-            </a:spcBef>
-            <a:spcAft>
-              <a:spcPct val="35000"/>
-            </a:spcAft>
-          </a:pPr>
-          <a:r>
-            <a:rPr lang="fr-FR" sz="1400" b="0" kern="1200" dirty="0" smtClean="0"/>
-            <a:t>choix via menu (consultation ou </a:t>
-          </a:r>
-          <a:r>
-            <a:rPr lang="fr-FR" sz="1400" b="0" kern="1200" dirty="0" err="1" smtClean="0"/>
-            <a:t>modif</a:t>
-          </a:r>
-          <a:r>
-            <a:rPr lang="fr-FR" sz="1400" b="0" kern="1200" dirty="0" smtClean="0"/>
-            <a:t>)</a:t>
-          </a:r>
-          <a:endParaRPr lang="fr-FR" sz="1400" b="0" kern="1200" dirty="0"/>
-        </a:p>
-      </dsp:txBody>
-      <dsp:txXfrm>
-        <a:off x="4276313" y="1411647"/>
-        <a:ext cx="1358335" cy="850703"/>
-      </dsp:txXfrm>
-    </dsp:sp>
-    <dsp:sp modelId="{0630741F-6C40-4F3F-B890-314A4B79923F}">
-      <dsp:nvSpPr>
-        <dsp:cNvPr id="0" name=""/>
-        <dsp:cNvSpPr/>
-      </dsp:nvSpPr>
-      <dsp:spPr>
-        <a:xfrm>
-          <a:off x="1260633" y="418400"/>
-          <a:ext cx="3767293" cy="3767293"/>
-        </a:xfrm>
-        <a:custGeom>
-          <a:avLst/>
-          <a:gdLst/>
-          <a:ahLst/>
-          <a:cxnLst/>
-          <a:rect l="0" t="0" r="0" b="0"/>
-          <a:pathLst>
-            <a:path>
-              <a:moveTo>
-                <a:pt x="3753769" y="2108954"/>
-              </a:moveTo>
-              <a:arcTo wR="1883646" hR="1883646" stAng="412186" swAng="1231416"/>
-            </a:path>
-          </a:pathLst>
-        </a:custGeom>
-        <a:noFill/>
-        <a:ln w="12700" cap="flat" cmpd="sng" algn="ctr">
-          <a:solidFill>
-            <a:schemeClr val="accent3">
-              <a:hueOff val="0"/>
-              <a:satOff val="0"/>
-              <a:lumOff val="0"/>
-              <a:alphaOff val="0"/>
-            </a:schemeClr>
-          </a:solidFill>
-          <a:prstDash val="solid"/>
-          <a:tailEnd type="arrow"/>
-        </a:ln>
-        <a:effectLst/>
-      </dsp:spPr>
-      <dsp:style>
-        <a:lnRef idx="1">
-          <a:scrgbClr r="0" g="0" b="0"/>
-        </a:lnRef>
-        <a:fillRef idx="0">
-          <a:scrgbClr r="0" g="0" b="0"/>
-        </a:fillRef>
-        <a:effectRef idx="0">
-          <a:scrgbClr r="0" g="0" b="0"/>
-        </a:effectRef>
-        <a:fontRef idx="minor"/>
-      </dsp:style>
-    </dsp:sp>
-    <dsp:sp modelId="{C8F751D6-D82F-496C-AD58-79670C73541F}">
-      <dsp:nvSpPr>
-        <dsp:cNvPr id="0" name=""/>
-        <dsp:cNvSpPr/>
-      </dsp:nvSpPr>
-      <dsp:spPr>
-        <a:xfrm>
-          <a:off x="3546031" y="3357297"/>
-          <a:ext cx="1450377" cy="942745"/>
-        </a:xfrm>
-        <a:prstGeom prst="roundRect">
-          <a:avLst/>
-        </a:prstGeom>
-        <a:solidFill>
-          <a:schemeClr val="accent4">
-            <a:hueOff val="0"/>
-            <a:satOff val="0"/>
-            <a:lumOff val="0"/>
-            <a:alphaOff val="0"/>
-          </a:schemeClr>
-        </a:solidFill>
-        <a:ln w="15875" cap="flat" cmpd="sng" algn="ctr">
-          <a:solidFill>
-            <a:schemeClr val="lt1">
-              <a:hueOff val="0"/>
-              <a:satOff val="0"/>
-              <a:lumOff val="0"/>
-              <a:alphaOff val="0"/>
-            </a:schemeClr>
-          </a:solidFill>
-          <a:prstDash val="solid"/>
-        </a:ln>
-        <a:effectLst/>
-      </dsp:spPr>
-      <dsp:style>
-        <a:lnRef idx="2">
-          <a:scrgbClr r="0" g="0" b="0"/>
-        </a:lnRef>
-        <a:fillRef idx="1">
-          <a:scrgbClr r="0" g="0" b="0"/>
-        </a:fillRef>
-        <a:effectRef idx="0">
-          <a:scrgbClr r="0" g="0" b="0"/>
-        </a:effectRef>
-        <a:fontRef idx="minor">
-          <a:schemeClr val="lt1"/>
-        </a:fontRef>
-      </dsp:style>
-      <dsp:txBody>
-        <a:bodyPr spcFirstLastPara="0" vert="horz" wrap="square" lIns="53340" tIns="53340" rIns="53340" bIns="53340" numCol="1" spcCol="1270" anchor="ctr" anchorCtr="0">
-          <a:noAutofit/>
-        </a:bodyPr>
-        <a:lstStyle/>
-        <a:p>
-          <a:pPr lvl="0" algn="ctr" defTabSz="622300">
-            <a:lnSpc>
-              <a:spcPct val="90000"/>
-            </a:lnSpc>
-            <a:spcBef>
-              <a:spcPct val="0"/>
-            </a:spcBef>
-            <a:spcAft>
-              <a:spcPct val="35000"/>
-            </a:spcAft>
-          </a:pPr>
-          <a:r>
-            <a:rPr lang="fr-FR" sz="1400" b="0" kern="1200" dirty="0" smtClean="0"/>
-            <a:t>Etape 3 : </a:t>
-          </a:r>
-        </a:p>
-        <a:p>
-          <a:pPr lvl="0" algn="ctr" defTabSz="622300">
-            <a:lnSpc>
-              <a:spcPct val="90000"/>
-            </a:lnSpc>
-            <a:spcBef>
-              <a:spcPct val="0"/>
-            </a:spcBef>
-            <a:spcAft>
-              <a:spcPct val="35000"/>
-            </a:spcAft>
-          </a:pPr>
-          <a:r>
-            <a:rPr lang="fr-FR" sz="1400" b="0" kern="1200" dirty="0" smtClean="0"/>
-            <a:t>Cliquer sur ce que l’on veut modifier</a:t>
-          </a:r>
-          <a:endParaRPr lang="fr-FR" sz="1400" b="0" kern="1200" dirty="0"/>
-        </a:p>
-      </dsp:txBody>
-      <dsp:txXfrm>
-        <a:off x="3592052" y="3403318"/>
-        <a:ext cx="1358335" cy="850703"/>
-      </dsp:txXfrm>
-    </dsp:sp>
-    <dsp:sp modelId="{0185F18E-2A47-48E8-BFD5-9936BEC7A951}">
-      <dsp:nvSpPr>
-        <dsp:cNvPr id="0" name=""/>
-        <dsp:cNvSpPr/>
-      </dsp:nvSpPr>
-      <dsp:spPr>
-        <a:xfrm>
-          <a:off x="1282944" y="438212"/>
-          <a:ext cx="3767293" cy="3767293"/>
-        </a:xfrm>
-        <a:custGeom>
-          <a:avLst/>
-          <a:gdLst/>
-          <a:ahLst/>
-          <a:cxnLst/>
-          <a:rect l="0" t="0" r="0" b="0"/>
-          <a:pathLst>
-            <a:path>
-              <a:moveTo>
-                <a:pt x="2101999" y="3754594"/>
-              </a:moveTo>
-              <a:arcTo wR="1883646" hR="1883646" stAng="5000597" swAng="905499"/>
-            </a:path>
-          </a:pathLst>
-        </a:custGeom>
-        <a:noFill/>
-        <a:ln w="12700" cap="flat" cmpd="sng" algn="ctr">
-          <a:solidFill>
-            <a:schemeClr val="accent4">
-              <a:hueOff val="0"/>
-              <a:satOff val="0"/>
-              <a:lumOff val="0"/>
-              <a:alphaOff val="0"/>
-            </a:schemeClr>
-          </a:solidFill>
-          <a:prstDash val="solid"/>
-          <a:tailEnd type="arrow"/>
-        </a:ln>
-        <a:effectLst/>
-      </dsp:spPr>
-      <dsp:style>
-        <a:lnRef idx="1">
-          <a:scrgbClr r="0" g="0" b="0"/>
-        </a:lnRef>
-        <a:fillRef idx="0">
-          <a:scrgbClr r="0" g="0" b="0"/>
-        </a:fillRef>
-        <a:effectRef idx="0">
-          <a:scrgbClr r="0" g="0" b="0"/>
-        </a:effectRef>
-        <a:fontRef idx="minor"/>
-      </dsp:style>
-    </dsp:sp>
-    <dsp:sp modelId="{31A326BC-78C0-4B08-940D-EFBF215F6455}">
-      <dsp:nvSpPr>
-        <dsp:cNvPr id="0" name=""/>
-        <dsp:cNvSpPr/>
-      </dsp:nvSpPr>
-      <dsp:spPr>
-        <a:xfrm>
-          <a:off x="1279702" y="3336513"/>
-          <a:ext cx="1450377" cy="942745"/>
-        </a:xfrm>
-        <a:prstGeom prst="roundRect">
-          <a:avLst/>
-        </a:prstGeom>
-        <a:solidFill>
-          <a:schemeClr val="accent5">
-            <a:hueOff val="0"/>
-            <a:satOff val="0"/>
-            <a:lumOff val="0"/>
-            <a:alphaOff val="0"/>
-          </a:schemeClr>
-        </a:solidFill>
-        <a:ln w="15875" cap="flat" cmpd="sng" algn="ctr">
-          <a:solidFill>
-            <a:schemeClr val="lt1">
-              <a:hueOff val="0"/>
-              <a:satOff val="0"/>
-              <a:lumOff val="0"/>
-              <a:alphaOff val="0"/>
-            </a:schemeClr>
-          </a:solidFill>
-          <a:prstDash val="solid"/>
-        </a:ln>
-        <a:effectLst/>
-      </dsp:spPr>
-      <dsp:style>
-        <a:lnRef idx="2">
-          <a:scrgbClr r="0" g="0" b="0"/>
-        </a:lnRef>
-        <a:fillRef idx="1">
-          <a:scrgbClr r="0" g="0" b="0"/>
-        </a:fillRef>
-        <a:effectRef idx="0">
-          <a:scrgbClr r="0" g="0" b="0"/>
-        </a:effectRef>
-        <a:fontRef idx="minor">
-          <a:schemeClr val="lt1"/>
-        </a:fontRef>
-      </dsp:style>
-      <dsp:txBody>
-        <a:bodyPr spcFirstLastPara="0" vert="horz" wrap="square" lIns="53340" tIns="53340" rIns="53340" bIns="53340" numCol="1" spcCol="1270" anchor="ctr" anchorCtr="0">
-          <a:noAutofit/>
-        </a:bodyPr>
-        <a:lstStyle/>
-        <a:p>
-          <a:pPr lvl="0" algn="ctr" defTabSz="622300">
-            <a:lnSpc>
-              <a:spcPct val="90000"/>
-            </a:lnSpc>
-            <a:spcBef>
-              <a:spcPct val="0"/>
-            </a:spcBef>
-            <a:spcAft>
-              <a:spcPct val="35000"/>
-            </a:spcAft>
-          </a:pPr>
-          <a:r>
-            <a:rPr lang="fr-FR" sz="1400" b="0" kern="1200" dirty="0" smtClean="0"/>
-            <a:t>Etape 4 : </a:t>
-          </a:r>
-        </a:p>
-        <a:p>
-          <a:pPr lvl="0" algn="ctr" defTabSz="622300">
-            <a:lnSpc>
-              <a:spcPct val="90000"/>
-            </a:lnSpc>
-            <a:spcBef>
-              <a:spcPct val="0"/>
-            </a:spcBef>
-            <a:spcAft>
-              <a:spcPct val="35000"/>
-            </a:spcAft>
-          </a:pPr>
-          <a:r>
-            <a:rPr lang="fr-FR" sz="1400" b="0" kern="1200" dirty="0" smtClean="0"/>
-            <a:t>Remplir le formulaire correctement</a:t>
-          </a:r>
-          <a:endParaRPr lang="fr-FR" sz="1400" b="0" kern="1200" dirty="0"/>
-        </a:p>
-      </dsp:txBody>
-      <dsp:txXfrm>
-        <a:off x="1325723" y="3382534"/>
-        <a:ext cx="1358335" cy="850703"/>
-      </dsp:txXfrm>
-    </dsp:sp>
-    <dsp:sp modelId="{585D472E-44CD-4D47-8B6B-CF5DA3B83EF5}">
-      <dsp:nvSpPr>
-        <dsp:cNvPr id="0" name=""/>
-        <dsp:cNvSpPr/>
-      </dsp:nvSpPr>
-      <dsp:spPr>
-        <a:xfrm>
-          <a:off x="1262374" y="405145"/>
-          <a:ext cx="3767293" cy="3767293"/>
-        </a:xfrm>
-        <a:custGeom>
-          <a:avLst/>
-          <a:gdLst/>
-          <a:ahLst/>
-          <a:cxnLst/>
-          <a:rect l="0" t="0" r="0" b="0"/>
-          <a:pathLst>
-            <a:path>
-              <a:moveTo>
-                <a:pt x="203589" y="2735428"/>
-              </a:moveTo>
-              <a:arcTo wR="1883646" hR="1883646" stAng="9186911" swAng="1276552"/>
-            </a:path>
-          </a:pathLst>
-        </a:custGeom>
-        <a:noFill/>
-        <a:ln w="12700" cap="flat" cmpd="sng" algn="ctr">
-          <a:solidFill>
-            <a:schemeClr val="accent5">
-              <a:hueOff val="0"/>
-              <a:satOff val="0"/>
-              <a:lumOff val="0"/>
-              <a:alphaOff val="0"/>
-            </a:schemeClr>
-          </a:solidFill>
-          <a:prstDash val="solid"/>
-          <a:tailEnd type="arrow"/>
-        </a:ln>
-        <a:effectLst/>
-      </dsp:spPr>
-      <dsp:style>
-        <a:lnRef idx="1">
-          <a:scrgbClr r="0" g="0" b="0"/>
-        </a:lnRef>
-        <a:fillRef idx="0">
-          <a:scrgbClr r="0" g="0" b="0"/>
-        </a:fillRef>
-        <a:effectRef idx="0">
-          <a:scrgbClr r="0" g="0" b="0"/>
-        </a:effectRef>
-        <a:fontRef idx="minor"/>
-      </dsp:style>
-    </dsp:sp>
-    <dsp:sp modelId="{6830C4F8-0F29-428E-9993-01945ED56F24}">
-      <dsp:nvSpPr>
-        <dsp:cNvPr id="0" name=""/>
-        <dsp:cNvSpPr/>
-      </dsp:nvSpPr>
-      <dsp:spPr>
-        <a:xfrm>
-          <a:off x="626608" y="1303280"/>
-          <a:ext cx="1450377" cy="942745"/>
-        </a:xfrm>
-        <a:prstGeom prst="roundRect">
-          <a:avLst/>
-        </a:prstGeom>
-        <a:solidFill>
-          <a:schemeClr val="accent6">
-            <a:hueOff val="0"/>
-            <a:satOff val="0"/>
-            <a:lumOff val="0"/>
-            <a:alphaOff val="0"/>
-          </a:schemeClr>
-        </a:solidFill>
-        <a:ln w="15875" cap="flat" cmpd="sng" algn="ctr">
-          <a:solidFill>
-            <a:schemeClr val="lt1">
-              <a:hueOff val="0"/>
-              <a:satOff val="0"/>
-              <a:lumOff val="0"/>
-              <a:alphaOff val="0"/>
-            </a:schemeClr>
-          </a:solidFill>
-          <a:prstDash val="solid"/>
-        </a:ln>
-        <a:effectLst/>
-      </dsp:spPr>
-      <dsp:style>
-        <a:lnRef idx="2">
-          <a:scrgbClr r="0" g="0" b="0"/>
-        </a:lnRef>
-        <a:fillRef idx="1">
-          <a:scrgbClr r="0" g="0" b="0"/>
-        </a:fillRef>
-        <a:effectRef idx="0">
-          <a:scrgbClr r="0" g="0" b="0"/>
-        </a:effectRef>
-        <a:fontRef idx="minor">
-          <a:schemeClr val="lt1"/>
-        </a:fontRef>
-      </dsp:style>
-      <dsp:txBody>
-        <a:bodyPr spcFirstLastPara="0" vert="horz" wrap="square" lIns="53340" tIns="53340" rIns="53340" bIns="53340" numCol="1" spcCol="1270" anchor="ctr" anchorCtr="0">
-          <a:noAutofit/>
-        </a:bodyPr>
-        <a:lstStyle/>
-        <a:p>
-          <a:pPr lvl="0" algn="ctr" defTabSz="622300">
-            <a:lnSpc>
-              <a:spcPct val="90000"/>
-            </a:lnSpc>
-            <a:spcBef>
-              <a:spcPct val="0"/>
-            </a:spcBef>
-            <a:spcAft>
-              <a:spcPct val="35000"/>
-            </a:spcAft>
-          </a:pPr>
-          <a:r>
-            <a:rPr lang="fr-FR" sz="1400" b="0" i="0" kern="1200" dirty="0" smtClean="0">
-              <a:effectLst/>
-            </a:rPr>
-            <a:t>Etape 5 :</a:t>
-          </a:r>
-        </a:p>
-        <a:p>
-          <a:pPr lvl="0" algn="ctr" defTabSz="622300">
-            <a:lnSpc>
-              <a:spcPct val="90000"/>
-            </a:lnSpc>
-            <a:spcBef>
-              <a:spcPct val="0"/>
-            </a:spcBef>
-            <a:spcAft>
-              <a:spcPct val="35000"/>
-            </a:spcAft>
-          </a:pPr>
-          <a:r>
-            <a:rPr lang="fr-FR" sz="1400" b="0" i="0" kern="1200" dirty="0" smtClean="0">
-              <a:effectLst/>
-            </a:rPr>
-            <a:t> </a:t>
-          </a:r>
-          <a:r>
-            <a:rPr lang="fr-FR" sz="1400" b="0" kern="1200" dirty="0" smtClean="0"/>
-            <a:t>valider / envoyer</a:t>
-          </a:r>
-          <a:endParaRPr lang="fr-FR" sz="1400" b="0" kern="1200" dirty="0"/>
-        </a:p>
-      </dsp:txBody>
-      <dsp:txXfrm>
-        <a:off x="672629" y="1349301"/>
-        <a:ext cx="1358335" cy="850703"/>
-      </dsp:txXfrm>
-    </dsp:sp>
-    <dsp:sp modelId="{BFD287F0-33B0-489A-9EEC-062382A8DE94}">
-      <dsp:nvSpPr>
-        <dsp:cNvPr id="0" name=""/>
-        <dsp:cNvSpPr/>
-      </dsp:nvSpPr>
-      <dsp:spPr>
-        <a:xfrm>
-          <a:off x="1259604" y="473085"/>
-          <a:ext cx="3767293" cy="3767293"/>
-        </a:xfrm>
-        <a:custGeom>
-          <a:avLst/>
-          <a:gdLst/>
-          <a:ahLst/>
-          <a:cxnLst/>
-          <a:rect l="0" t="0" r="0" b="0"/>
-          <a:pathLst>
-            <a:path>
-              <a:moveTo>
-                <a:pt x="453049" y="658282"/>
-              </a:moveTo>
-              <a:arcTo wR="1883646" hR="1883646" stAng="13234883" swAng="1211926"/>
-            </a:path>
-          </a:pathLst>
-        </a:custGeom>
-        <a:noFill/>
-        <a:ln w="12700" cap="flat" cmpd="sng" algn="ctr">
-          <a:solidFill>
-            <a:schemeClr val="accent6">
-              <a:hueOff val="0"/>
-              <a:satOff val="0"/>
-              <a:lumOff val="0"/>
-              <a:alphaOff val="0"/>
-            </a:schemeClr>
-          </a:solidFill>
-          <a:prstDash val="solid"/>
-          <a:tailEnd type="arrow"/>
-        </a:ln>
-        <a:effectLst/>
-      </dsp:spPr>
-      <dsp:style>
-        <a:lnRef idx="1">
-          <a:scrgbClr r="0" g="0" b="0"/>
-        </a:lnRef>
-        <a:fillRef idx="0">
-          <a:scrgbClr r="0" g="0" b="0"/>
-        </a:fillRef>
-        <a:effectRef idx="0">
-          <a:scrgbClr r="0" g="0" b="0"/>
-        </a:effectRef>
-        <a:fontRef idx="minor"/>
-      </dsp:style>
-    </dsp:sp>
   </dsp:spTree>
 </dsp:drawing>
 </file>
@@ -22337,15 +19576,7 @@
           <a:p>
             <a:r>
               <a:rPr lang="fr-FR" dirty="0" smtClean="0"/>
-              <a:t>Sprint </a:t>
-            </a:r>
-            <a:r>
-              <a:rPr lang="fr-FR" dirty="0" smtClean="0"/>
-              <a:t>0 </a:t>
-            </a:r>
-            <a:r>
-              <a:rPr lang="fr-FR" dirty="0" smtClean="0"/>
-              <a:t>: </a:t>
+              <a:t>Sprint 0 : </a:t>
             </a:r>
             <a:endParaRPr lang="fr-FR" dirty="0"/>
           </a:p>
@@ -22508,7 +19739,6 @@
               <a:rPr lang="fr-FR" dirty="0" smtClean="0"/>
               <a:t>Décisions pour les sprints suivants</a:t>
             </a:r>
-            <a:endParaRPr lang="fr-FR" dirty="0" smtClean="0"/>
           </a:p>
           <a:p>
             <a:pPr>
@@ -22848,11 +20078,7 @@
                       <a:pPr algn="ctr"/>
                       <a:r>
                         <a:rPr lang="fr-FR" dirty="0" smtClean="0"/>
-                        <a:t>Docteur en </a:t>
-                      </a:r>
-                      <a:r>
-                        <a:rPr lang="fr-FR" dirty="0" smtClean="0"/>
-                        <a:t>chimie</a:t>
+                        <a:t>Docteur en chimie</a:t>
                       </a:r>
                       <a:endParaRPr lang="fr-FR" dirty="0"/>
                     </a:p>
@@ -23302,11 +20528,7 @@
             </a:r>
             <a:r>
               <a:rPr lang="fr-FR" dirty="0" smtClean="0"/>
-              <a:t>Annotations </a:t>
-            </a:r>
-            <a:r>
-              <a:rPr lang="fr-FR" dirty="0" smtClean="0"/>
-              <a:t>des Java </a:t>
+              <a:t>Annotations des Java </a:t>
             </a:r>
             <a:r>
               <a:rPr lang="fr-FR" dirty="0" err="1" smtClean="0"/>
@@ -23328,11 +20550,7 @@
             </a:r>
             <a:r>
               <a:rPr lang="fr-FR" dirty="0" smtClean="0"/>
-              <a:t>Intégration à la base de données</a:t>
-            </a:r>
-            <a:r>
-              <a:rPr lang="fr-FR" dirty="0" smtClean="0"/>
-              <a:t> </a:t>
+              <a:t>Intégration à la base de données </a:t>
             </a:r>
           </a:p>
           <a:p>
@@ -23488,11 +20706,7 @@
           <a:p>
             <a:r>
               <a:rPr lang="fr-FR" dirty="0" smtClean="0"/>
-              <a:t>Sprint </a:t>
-            </a:r>
-            <a:r>
-              <a:rPr lang="fr-FR" dirty="0" smtClean="0"/>
-              <a:t>2 :  </a:t>
+              <a:t>Sprint 2 :  </a:t>
             </a:r>
             <a:endParaRPr lang="fr-FR" dirty="0"/>
           </a:p>
@@ -23838,7 +21052,6 @@
               <a:rPr lang="fr-FR" sz="2000" dirty="0" smtClean="0"/>
               <a:t>Ajout d’une feuille de style complète</a:t>
             </a:r>
-            <a:endParaRPr lang="fr-FR" sz="2000" dirty="0" smtClean="0"/>
           </a:p>
           <a:p>
             <a:pPr marL="342900" lvl="1" indent="-342900">
@@ -24428,6 +21641,43 @@
           </a:p>
         </p:txBody>
       </p:sp>
+      <p:pic>
+        <p:nvPicPr>
+          <p:cNvPr id="3" name="Image 2"/>
+          <p:cNvPicPr>
+            <a:picLocks noChangeAspect="1"/>
+          </p:cNvPicPr>
+          <p:nvPr/>
+        </p:nvPicPr>
+        <p:blipFill rotWithShape="1">
+          <a:blip r:embed="rId2"/>
+          <a:srcRect l="22720" t="6018" r="23280" b="45768"/>
+          <a:stretch/>
+        </p:blipFill>
+        <p:spPr>
+          <a:xfrm>
+            <a:off x="2011680" y="1901952"/>
+            <a:ext cx="8229600" cy="4133088"/>
+          </a:xfrm>
+          <a:prstGeom prst="rect">
+            <a:avLst/>
+          </a:prstGeom>
+          <a:ln w="38100" cap="sq">
+            <a:solidFill>
+              <a:srgbClr val="000000"/>
+            </a:solidFill>
+            <a:prstDash val="solid"/>
+            <a:miter lim="800000"/>
+          </a:ln>
+          <a:effectLst>
+            <a:outerShdw blurRad="50800" dist="38100" dir="2700000" algn="tl" rotWithShape="0">
+              <a:srgbClr val="000000">
+                <a:alpha val="43000"/>
+              </a:srgbClr>
+            </a:outerShdw>
+          </a:effectLst>
+        </p:spPr>
+      </p:pic>
     </p:spTree>
     <p:extLst>
       <p:ext uri="{BB962C8B-B14F-4D97-AF65-F5344CB8AC3E}">
@@ -24533,7 +21783,6 @@
               <a:rPr lang="fr-FR" dirty="0" smtClean="0"/>
               <a:t>je souhaite pouvoir ajouter, modifier ou supprimer une matière de mon centre de formation</a:t>
             </a:r>
-            <a:endParaRPr lang="fr-FR" dirty="0" smtClean="0"/>
           </a:p>
           <a:p>
             <a:pPr>
@@ -24591,11 +21840,7 @@
             </a:pPr>
             <a:r>
               <a:rPr lang="fr-FR" dirty="0" smtClean="0"/>
-              <a:t>Critères d’acceptation </a:t>
-            </a:r>
-            <a:r>
-              <a:rPr lang="fr-FR" dirty="0" smtClean="0"/>
-              <a:t>: Ajout et modification possible avec envoi en base de données.</a:t>
+              <a:t>Critères d’acceptation : Ajout et modification possible avec envoi en base de données.</a:t>
             </a:r>
             <a:endParaRPr lang="fr-FR" dirty="0"/>
           </a:p>
@@ -25259,11 +22504,7 @@
             </a:pPr>
             <a:r>
               <a:rPr lang="fr-FR" dirty="0" smtClean="0"/>
-              <a:t>Possibilités </a:t>
-            </a:r>
-            <a:r>
-              <a:rPr lang="fr-FR" dirty="0" smtClean="0"/>
-              <a:t>d’interagir sur toutes les ressources : humaines et matérielles </a:t>
+              <a:t>Possibilités d’interagir sur toutes les ressources : humaines et matérielles </a:t>
             </a:r>
           </a:p>
           <a:p>
@@ -25746,11 +22987,7 @@
             </a:pPr>
             <a:r>
               <a:rPr lang="fr-FR" dirty="0" smtClean="0"/>
-              <a:t> Difficultés à se séparer les tâches correctement ou </a:t>
-            </a:r>
-            <a:r>
-              <a:rPr lang="fr-FR" dirty="0" smtClean="0"/>
-              <a:t>proprement</a:t>
+              <a:t> Difficultés à se séparer les tâches correctement ou proprement</a:t>
             </a:r>
           </a:p>
           <a:p>
@@ -25777,7 +23014,6 @@
               <a:rPr lang="fr-FR" dirty="0" smtClean="0"/>
               <a:t>)</a:t>
             </a:r>
-            <a:endParaRPr lang="fr-FR" dirty="0" smtClean="0"/>
           </a:p>
           <a:p>
             <a:pPr>
@@ -25789,11 +23025,7 @@
             </a:pPr>
             <a:r>
               <a:rPr lang="fr-FR" dirty="0" smtClean="0"/>
-              <a:t> Difficultés à savoir quels outils </a:t>
-            </a:r>
-            <a:r>
-              <a:rPr lang="fr-FR" dirty="0" smtClean="0"/>
-              <a:t>et connaissances utiliser</a:t>
+              <a:t> Difficultés à savoir quels outils et connaissances utiliser</a:t>
             </a:r>
             <a:endParaRPr lang="fr-FR" dirty="0"/>
           </a:p>
@@ -27330,15 +24562,7 @@
           <a:p>
             <a:r>
               <a:rPr lang="fr-FR" dirty="0" smtClean="0"/>
-              <a:t>Exemple </a:t>
-            </a:r>
-            <a:r>
-              <a:rPr lang="fr-FR" dirty="0" smtClean="0"/>
-              <a:t>d’édition </a:t>
-            </a:r>
-            <a:r>
-              <a:rPr lang="fr-FR" dirty="0" smtClean="0"/>
-              <a:t>d’un module </a:t>
+              <a:t>Exemple d’édition d’un module </a:t>
             </a:r>
             <a:endParaRPr lang="fr-FR" dirty="0"/>
           </a:p>
@@ -27365,11 +24589,7 @@
             </a:pPr>
             <a:r>
               <a:rPr lang="fr-FR" dirty="0" smtClean="0"/>
-              <a:t> Choisir </a:t>
-            </a:r>
-            <a:r>
-              <a:rPr lang="fr-FR" dirty="0" smtClean="0"/>
-              <a:t>le prof associé,</a:t>
+              <a:t> Choisir le prof associé,</a:t>
             </a:r>
           </a:p>
           <a:p>
@@ -27379,11 +24599,7 @@
             </a:pPr>
             <a:r>
               <a:rPr lang="fr-FR" dirty="0" smtClean="0"/>
-              <a:t> Choisir </a:t>
-            </a:r>
-            <a:r>
-              <a:rPr lang="fr-FR" dirty="0" smtClean="0"/>
-              <a:t>la salle </a:t>
+              <a:t> Choisir la salle </a:t>
             </a:r>
           </a:p>
           <a:p>
@@ -27393,11 +24609,7 @@
             </a:pPr>
             <a:r>
               <a:rPr lang="fr-FR" dirty="0" smtClean="0"/>
-              <a:t> Choisir </a:t>
-            </a:r>
-            <a:r>
-              <a:rPr lang="fr-FR" dirty="0" smtClean="0"/>
-              <a:t>les élèves </a:t>
+              <a:t> Choisir les élèves </a:t>
             </a:r>
           </a:p>
           <a:p>
@@ -27407,19 +24619,11 @@
             </a:pPr>
             <a:r>
               <a:rPr lang="fr-FR" dirty="0"/>
-              <a:t> </a:t>
-            </a:r>
-            <a:r>
-              <a:rPr lang="fr-FR" dirty="0"/>
-              <a:t>C</a:t>
+              <a:t> C</a:t>
             </a:r>
             <a:r>
               <a:rPr lang="fr-FR" dirty="0" smtClean="0"/>
-              <a:t>hoisir </a:t>
-            </a:r>
-            <a:r>
-              <a:rPr lang="fr-FR" dirty="0" smtClean="0"/>
-              <a:t>la matière </a:t>
+              <a:t>hoisir la matière </a:t>
             </a:r>
           </a:p>
           <a:p>
@@ -27444,19 +24648,11 @@
             </a:pPr>
             <a:r>
               <a:rPr lang="fr-FR" dirty="0"/>
-              <a:t> </a:t>
-            </a:r>
-            <a:r>
-              <a:rPr lang="fr-FR" dirty="0"/>
-              <a:t>D</a:t>
+              <a:t> D</a:t>
             </a:r>
             <a:r>
               <a:rPr lang="fr-FR" dirty="0" smtClean="0"/>
-              <a:t>éfinir </a:t>
-            </a:r>
-            <a:r>
-              <a:rPr lang="fr-FR" dirty="0" smtClean="0"/>
-              <a:t>les dates de début et fin </a:t>
+              <a:t>éfinir les dates de début et fin </a:t>
             </a:r>
           </a:p>
           <a:p>
@@ -27466,19 +24662,11 @@
             </a:pPr>
             <a:r>
               <a:rPr lang="fr-FR" dirty="0"/>
-              <a:t> </a:t>
-            </a:r>
-            <a:r>
-              <a:rPr lang="fr-FR" dirty="0"/>
-              <a:t>D</a:t>
+              <a:t> D</a:t>
             </a:r>
             <a:r>
               <a:rPr lang="fr-FR" dirty="0" smtClean="0"/>
-              <a:t>éfinir </a:t>
-            </a:r>
-            <a:r>
-              <a:rPr lang="fr-FR" dirty="0" smtClean="0"/>
-              <a:t>à quelle formation le module appartient. </a:t>
+              <a:t>éfinir à quelle formation le module appartient. </a:t>
             </a:r>
             <a:endParaRPr lang="fr-FR" dirty="0"/>
           </a:p>
@@ -28023,15 +25211,7 @@
             </a:pPr>
             <a:r>
               <a:rPr lang="fr-FR" sz="2800" dirty="0" smtClean="0"/>
-              <a:t> </a:t>
-            </a:r>
-            <a:r>
-              <a:rPr lang="fr-FR" sz="2800" dirty="0" smtClean="0"/>
-              <a:t>Nécessite </a:t>
-            </a:r>
-            <a:r>
-              <a:rPr lang="fr-FR" sz="2800" dirty="0" smtClean="0"/>
-              <a:t>une informatisation efficace du  </a:t>
+              <a:t> Nécessite une informatisation efficace du  </a:t>
             </a:r>
             <a:r>
               <a:rPr lang="fr-FR" sz="2800" dirty="0"/>
@@ -28199,11 +25379,7 @@
             </a:pPr>
             <a:r>
               <a:rPr lang="fr-FR" sz="2800" dirty="0" smtClean="0"/>
-              <a:t> faciliter </a:t>
-            </a:r>
-            <a:r>
-              <a:rPr lang="fr-FR" sz="2800" dirty="0" smtClean="0"/>
-              <a:t>la gestion des plannings </a:t>
+              <a:t> faciliter la gestion des plannings </a:t>
             </a:r>
           </a:p>
           <a:p>
@@ -28217,11 +25393,7 @@
             </a:r>
             <a:r>
               <a:rPr lang="fr-FR" sz="2800" dirty="0" smtClean="0"/>
-              <a:t>permettre </a:t>
-            </a:r>
-            <a:r>
-              <a:rPr lang="fr-FR" sz="2800" dirty="0" smtClean="0"/>
-              <a:t>d’identifier les utilisateurs </a:t>
+              <a:t>permettre d’identifier les utilisateurs </a:t>
             </a:r>
           </a:p>
           <a:p>
@@ -28235,11 +25407,7 @@
             </a:r>
             <a:r>
               <a:rPr lang="fr-FR" sz="2800" dirty="0" smtClean="0"/>
-              <a:t>permettre l’affichage </a:t>
-            </a:r>
-            <a:r>
-              <a:rPr lang="fr-FR" sz="2800" dirty="0" smtClean="0"/>
-              <a:t>des supports (planning, cours, etc.) </a:t>
+              <a:t>permettre l’affichage des supports (planning, cours, etc.) </a:t>
             </a:r>
           </a:p>
           <a:p>
@@ -28253,11 +25421,7 @@
             </a:r>
             <a:r>
               <a:rPr lang="fr-FR" sz="2800" dirty="0" smtClean="0"/>
-              <a:t>avoir un </a:t>
-            </a:r>
-            <a:r>
-              <a:rPr lang="fr-FR" sz="2800" dirty="0" smtClean="0"/>
-              <a:t>administrateur de l’outil </a:t>
+              <a:t>avoir un administrateur de l’outil </a:t>
             </a:r>
           </a:p>
           <a:p>
@@ -28267,15 +25431,7 @@
             </a:pPr>
             <a:r>
               <a:rPr lang="fr-FR" sz="2800" dirty="0" smtClean="0"/>
-              <a:t> </a:t>
-            </a:r>
-            <a:r>
-              <a:rPr lang="fr-FR" sz="2800" dirty="0" smtClean="0"/>
-              <a:t>avoir différents </a:t>
-            </a:r>
-            <a:r>
-              <a:rPr lang="fr-FR" sz="2800" dirty="0" smtClean="0"/>
-              <a:t>modules pour créer, modifier, supprimer ou juste lire les informations</a:t>
+              <a:t> avoir différents modules pour créer, modifier, supprimer ou juste lire les informations</a:t>
             </a:r>
           </a:p>
           <a:p>
@@ -28303,11 +25459,7 @@
             </a:pPr>
             <a:r>
               <a:rPr lang="fr-FR" sz="2800" dirty="0" smtClean="0"/>
-              <a:t> avoir un outil </a:t>
-            </a:r>
-            <a:r>
-              <a:rPr lang="fr-FR" sz="2800" dirty="0" smtClean="0"/>
-              <a:t>évolutif</a:t>
+              <a:t> avoir un outil évolutif</a:t>
             </a:r>
           </a:p>
         </p:txBody>
@@ -28851,7 +26003,6 @@
               <a:rPr lang="fr-FR" sz="2400" dirty="0" smtClean="0"/>
               <a:t>Temps court et non reconductible : livraison d’un projet incomplet</a:t>
             </a:r>
-            <a:endParaRPr lang="fr-FR" sz="2400" dirty="0" smtClean="0"/>
           </a:p>
           <a:p>
             <a:pPr>
@@ -28876,7 +26027,6 @@
               <a:rPr lang="fr-FR" sz="2400" dirty="0" smtClean="0"/>
               <a:t>Gestion des alertes</a:t>
             </a:r>
-            <a:endParaRPr lang="fr-FR" sz="2400" dirty="0" smtClean="0"/>
           </a:p>
           <a:p>
             <a:pPr>
@@ -28885,11 +26035,7 @@
             </a:pPr>
             <a:r>
               <a:rPr lang="fr-FR" sz="2400" dirty="0" smtClean="0"/>
-              <a:t> </a:t>
-            </a:r>
-            <a:r>
-              <a:rPr lang="fr-FR" sz="2400" dirty="0" smtClean="0"/>
-              <a:t>Intégration et automatisation d’un calendrier (commun)</a:t>
+              <a:t> Intégration et automatisation d’un calendrier (commun)</a:t>
             </a:r>
           </a:p>
           <a:p>
@@ -28901,7 +26047,6 @@
               <a:rPr lang="fr-FR" sz="2400" dirty="0" smtClean="0"/>
               <a:t> Équipe nouvelle sur les technologies employées </a:t>
             </a:r>
-            <a:endParaRPr lang="fr-FR" sz="2400" dirty="0" smtClean="0"/>
           </a:p>
         </p:txBody>
       </p:sp>

</xml_diff>